<commit_message>
Added some content to documentation.
</commit_message>
<xml_diff>
--- a/Documentation/Presentation.pptx
+++ b/Documentation/Presentation.pptx
@@ -1,24 +1,119 @@
 
 <file path=ppt/presentation.xml><?xml version="1.0" encoding="utf-8"?>
-<p:presentation xmlns:a="http://schemas.openxmlformats.org/drawingml/2006/main" xmlns:p="http://schemas.openxmlformats.org/presentationml/2006/main" xmlns:r="http://schemas.openxmlformats.org/officeDocument/2006/relationships">
+<p:presentation xmlns:a="http://schemas.openxmlformats.org/drawingml/2006/main" xmlns:r="http://schemas.openxmlformats.org/officeDocument/2006/relationships" xmlns:p="http://schemas.openxmlformats.org/presentationml/2006/main">
   <p:sldMasterIdLst>
-    <p:sldMasterId id="2147483648" r:id="rId2"/>
+    <p:sldMasterId id="2147483648" r:id="rId1"/>
   </p:sldMasterIdLst>
   <p:sldIdLst>
-    <p:sldId id="256" r:id="rId3"/>
-    <p:sldId id="257" r:id="rId4"/>
-    <p:sldId id="258" r:id="rId5"/>
-    <p:sldId id="259" r:id="rId6"/>
-    <p:sldId id="260" r:id="rId7"/>
-    <p:sldId id="261" r:id="rId8"/>
+    <p:sldId id="256" r:id="rId2"/>
+    <p:sldId id="257" r:id="rId3"/>
+    <p:sldId id="258" r:id="rId4"/>
+    <p:sldId id="259" r:id="rId5"/>
+    <p:sldId id="260" r:id="rId6"/>
+    <p:sldId id="261" r:id="rId7"/>
   </p:sldIdLst>
   <p:sldSz cx="10080625" cy="7559675"/>
   <p:notesSz cx="7772400" cy="10058400"/>
+  <p:defaultTextStyle>
+    <a:defPPr>
+      <a:defRPr lang="en-US"/>
+    </a:defPPr>
+    <a:lvl1pPr marL="0" algn="l" defTabSz="914400" rtl="0" eaLnBrk="1" latinLnBrk="0" hangingPunct="1">
+      <a:defRPr sz="1800" kern="1200">
+        <a:solidFill>
+          <a:schemeClr val="tx1"/>
+        </a:solidFill>
+        <a:latin typeface="+mn-lt"/>
+        <a:ea typeface="+mn-ea"/>
+        <a:cs typeface="+mn-cs"/>
+      </a:defRPr>
+    </a:lvl1pPr>
+    <a:lvl2pPr marL="457200" algn="l" defTabSz="914400" rtl="0" eaLnBrk="1" latinLnBrk="0" hangingPunct="1">
+      <a:defRPr sz="1800" kern="1200">
+        <a:solidFill>
+          <a:schemeClr val="tx1"/>
+        </a:solidFill>
+        <a:latin typeface="+mn-lt"/>
+        <a:ea typeface="+mn-ea"/>
+        <a:cs typeface="+mn-cs"/>
+      </a:defRPr>
+    </a:lvl2pPr>
+    <a:lvl3pPr marL="914400" algn="l" defTabSz="914400" rtl="0" eaLnBrk="1" latinLnBrk="0" hangingPunct="1">
+      <a:defRPr sz="1800" kern="1200">
+        <a:solidFill>
+          <a:schemeClr val="tx1"/>
+        </a:solidFill>
+        <a:latin typeface="+mn-lt"/>
+        <a:ea typeface="+mn-ea"/>
+        <a:cs typeface="+mn-cs"/>
+      </a:defRPr>
+    </a:lvl3pPr>
+    <a:lvl4pPr marL="1371600" algn="l" defTabSz="914400" rtl="0" eaLnBrk="1" latinLnBrk="0" hangingPunct="1">
+      <a:defRPr sz="1800" kern="1200">
+        <a:solidFill>
+          <a:schemeClr val="tx1"/>
+        </a:solidFill>
+        <a:latin typeface="+mn-lt"/>
+        <a:ea typeface="+mn-ea"/>
+        <a:cs typeface="+mn-cs"/>
+      </a:defRPr>
+    </a:lvl4pPr>
+    <a:lvl5pPr marL="1828800" algn="l" defTabSz="914400" rtl="0" eaLnBrk="1" latinLnBrk="0" hangingPunct="1">
+      <a:defRPr sz="1800" kern="1200">
+        <a:solidFill>
+          <a:schemeClr val="tx1"/>
+        </a:solidFill>
+        <a:latin typeface="+mn-lt"/>
+        <a:ea typeface="+mn-ea"/>
+        <a:cs typeface="+mn-cs"/>
+      </a:defRPr>
+    </a:lvl5pPr>
+    <a:lvl6pPr marL="2286000" algn="l" defTabSz="914400" rtl="0" eaLnBrk="1" latinLnBrk="0" hangingPunct="1">
+      <a:defRPr sz="1800" kern="1200">
+        <a:solidFill>
+          <a:schemeClr val="tx1"/>
+        </a:solidFill>
+        <a:latin typeface="+mn-lt"/>
+        <a:ea typeface="+mn-ea"/>
+        <a:cs typeface="+mn-cs"/>
+      </a:defRPr>
+    </a:lvl6pPr>
+    <a:lvl7pPr marL="2743200" algn="l" defTabSz="914400" rtl="0" eaLnBrk="1" latinLnBrk="0" hangingPunct="1">
+      <a:defRPr sz="1800" kern="1200">
+        <a:solidFill>
+          <a:schemeClr val="tx1"/>
+        </a:solidFill>
+        <a:latin typeface="+mn-lt"/>
+        <a:ea typeface="+mn-ea"/>
+        <a:cs typeface="+mn-cs"/>
+      </a:defRPr>
+    </a:lvl7pPr>
+    <a:lvl8pPr marL="3200400" algn="l" defTabSz="914400" rtl="0" eaLnBrk="1" latinLnBrk="0" hangingPunct="1">
+      <a:defRPr sz="1800" kern="1200">
+        <a:solidFill>
+          <a:schemeClr val="tx1"/>
+        </a:solidFill>
+        <a:latin typeface="+mn-lt"/>
+        <a:ea typeface="+mn-ea"/>
+        <a:cs typeface="+mn-cs"/>
+      </a:defRPr>
+    </a:lvl8pPr>
+    <a:lvl9pPr marL="3657600" algn="l" defTabSz="914400" rtl="0" eaLnBrk="1" latinLnBrk="0" hangingPunct="1">
+      <a:defRPr sz="1800" kern="1200">
+        <a:solidFill>
+          <a:schemeClr val="tx1"/>
+        </a:solidFill>
+        <a:latin typeface="+mn-lt"/>
+        <a:ea typeface="+mn-ea"/>
+        <a:cs typeface="+mn-cs"/>
+      </a:defRPr>
+    </a:lvl9pPr>
+  </p:defaultTextStyle>
 </p:presentation>
 </file>
 
 <file path=ppt/slideLayouts/slideLayout1.xml><?xml version="1.0" encoding="utf-8"?>
-<p:sldLayout xmlns:a="http://schemas.openxmlformats.org/drawingml/2006/main" xmlns:p="http://schemas.openxmlformats.org/presentationml/2006/main" xmlns:r="http://schemas.openxmlformats.org/officeDocument/2006/relationships" type="blank" preserve="1">
+<p:sldLayout xmlns:a="http://schemas.openxmlformats.org/drawingml/2006/main" xmlns:r="http://schemas.openxmlformats.org/officeDocument/2006/relationships" xmlns:p="http://schemas.openxmlformats.org/presentationml/2006/main" type="blank" preserve="1">
   <p:cSld name="Blank Slide">
     <p:spTree>
       <p:nvGrpSpPr>
@@ -36,11 +131,14 @@
       </p:grpSpPr>
     </p:spTree>
   </p:cSld>
+  <p:clrMapOvr>
+    <a:masterClrMapping/>
+  </p:clrMapOvr>
 </p:sldLayout>
 </file>
 
 <file path=ppt/slideLayouts/slideLayout10.xml><?xml version="1.0" encoding="utf-8"?>
-<p:sldLayout xmlns:a="http://schemas.openxmlformats.org/drawingml/2006/main" xmlns:p="http://schemas.openxmlformats.org/presentationml/2006/main" xmlns:r="http://schemas.openxmlformats.org/officeDocument/2006/relationships" type="objOverTx" preserve="1">
+<p:sldLayout xmlns:a="http://schemas.openxmlformats.org/drawingml/2006/main" xmlns:r="http://schemas.openxmlformats.org/officeDocument/2006/relationships" xmlns:p="http://schemas.openxmlformats.org/presentationml/2006/main" type="objOverTx" preserve="1">
   <p:cSld name="Title, Content over Content">
     <p:spTree>
       <p:nvGrpSpPr>
@@ -76,16 +174,17 @@
           </a:prstGeom>
         </p:spPr>
         <p:txBody>
-          <a:bodyPr lIns="0" rIns="0" tIns="0" bIns="0" anchor="ctr"/>
+          <a:bodyPr lIns="0" tIns="0" rIns="0" bIns="0" anchor="ctr"/>
+          <a:lstStyle/>
           <a:p>
             <a:pPr algn="ctr"/>
-            <a:endParaRPr lang="en-CA" sz="4400" spc="-1" strike="noStrike">
-              <a:solidFill>
-                <a:srgbClr val="000000"/>
-              </a:solidFill>
-              <a:uFill>
-                <a:solidFill>
-                  <a:srgbClr val="ffffff"/>
+            <a:endParaRPr lang="en-CA" sz="4400" strike="noStrike" spc="-1">
+              <a:solidFill>
+                <a:srgbClr val="000000"/>
+              </a:solidFill>
+              <a:uFill>
+                <a:solidFill>
+                  <a:srgbClr val="FFFFFF"/>
                 </a:solidFill>
               </a:uFill>
               <a:latin typeface="Arial"/>
@@ -113,15 +212,16 @@
           </a:prstGeom>
         </p:spPr>
         <p:txBody>
-          <a:bodyPr lIns="0" rIns="0" tIns="0" bIns="0"/>
-          <a:p>
-            <a:endParaRPr lang="en-CA" sz="3200" spc="-1" strike="noStrike">
-              <a:solidFill>
-                <a:srgbClr val="000000"/>
-              </a:solidFill>
-              <a:uFill>
-                <a:solidFill>
-                  <a:srgbClr val="ffffff"/>
+          <a:bodyPr lIns="0" tIns="0" rIns="0" bIns="0"/>
+          <a:lstStyle/>
+          <a:p>
+            <a:endParaRPr lang="en-CA" sz="3200" strike="noStrike" spc="-1">
+              <a:solidFill>
+                <a:srgbClr val="000000"/>
+              </a:solidFill>
+              <a:uFill>
+                <a:solidFill>
+                  <a:srgbClr val="FFFFFF"/>
                 </a:solidFill>
               </a:uFill>
               <a:latin typeface="Arial"/>
@@ -149,15 +249,16 @@
           </a:prstGeom>
         </p:spPr>
         <p:txBody>
-          <a:bodyPr lIns="0" rIns="0" tIns="0" bIns="0"/>
-          <a:p>
-            <a:endParaRPr lang="en-CA" sz="3200" spc="-1" strike="noStrike">
-              <a:solidFill>
-                <a:srgbClr val="000000"/>
-              </a:solidFill>
-              <a:uFill>
-                <a:solidFill>
-                  <a:srgbClr val="ffffff"/>
+          <a:bodyPr lIns="0" tIns="0" rIns="0" bIns="0"/>
+          <a:lstStyle/>
+          <a:p>
+            <a:endParaRPr lang="en-CA" sz="3200" strike="noStrike" spc="-1">
+              <a:solidFill>
+                <a:srgbClr val="000000"/>
+              </a:solidFill>
+              <a:uFill>
+                <a:solidFill>
+                  <a:srgbClr val="FFFFFF"/>
                 </a:solidFill>
               </a:uFill>
               <a:latin typeface="Arial"/>
@@ -167,11 +268,14 @@
       </p:sp>
     </p:spTree>
   </p:cSld>
+  <p:clrMapOvr>
+    <a:masterClrMapping/>
+  </p:clrMapOvr>
 </p:sldLayout>
 </file>
 
 <file path=ppt/slideLayouts/slideLayout11.xml><?xml version="1.0" encoding="utf-8"?>
-<p:sldLayout xmlns:a="http://schemas.openxmlformats.org/drawingml/2006/main" xmlns:p="http://schemas.openxmlformats.org/presentationml/2006/main" xmlns:r="http://schemas.openxmlformats.org/officeDocument/2006/relationships" type="fourObj" preserve="1">
+<p:sldLayout xmlns:a="http://schemas.openxmlformats.org/drawingml/2006/main" xmlns:r="http://schemas.openxmlformats.org/officeDocument/2006/relationships" xmlns:p="http://schemas.openxmlformats.org/presentationml/2006/main" type="fourObj" preserve="1">
   <p:cSld name="Title, 4 Content">
     <p:spTree>
       <p:nvGrpSpPr>
@@ -207,16 +311,17 @@
           </a:prstGeom>
         </p:spPr>
         <p:txBody>
-          <a:bodyPr lIns="0" rIns="0" tIns="0" bIns="0" anchor="ctr"/>
+          <a:bodyPr lIns="0" tIns="0" rIns="0" bIns="0" anchor="ctr"/>
+          <a:lstStyle/>
           <a:p>
             <a:pPr algn="ctr"/>
-            <a:endParaRPr lang="en-CA" sz="4400" spc="-1" strike="noStrike">
-              <a:solidFill>
-                <a:srgbClr val="000000"/>
-              </a:solidFill>
-              <a:uFill>
-                <a:solidFill>
-                  <a:srgbClr val="ffffff"/>
+            <a:endParaRPr lang="en-CA" sz="4400" strike="noStrike" spc="-1">
+              <a:solidFill>
+                <a:srgbClr val="000000"/>
+              </a:solidFill>
+              <a:uFill>
+                <a:solidFill>
+                  <a:srgbClr val="FFFFFF"/>
                 </a:solidFill>
               </a:uFill>
               <a:latin typeface="Arial"/>
@@ -244,15 +349,16 @@
           </a:prstGeom>
         </p:spPr>
         <p:txBody>
-          <a:bodyPr lIns="0" rIns="0" tIns="0" bIns="0"/>
-          <a:p>
-            <a:endParaRPr lang="en-CA" sz="3200" spc="-1" strike="noStrike">
-              <a:solidFill>
-                <a:srgbClr val="000000"/>
-              </a:solidFill>
-              <a:uFill>
-                <a:solidFill>
-                  <a:srgbClr val="ffffff"/>
+          <a:bodyPr lIns="0" tIns="0" rIns="0" bIns="0"/>
+          <a:lstStyle/>
+          <a:p>
+            <a:endParaRPr lang="en-CA" sz="3200" strike="noStrike" spc="-1">
+              <a:solidFill>
+                <a:srgbClr val="000000"/>
+              </a:solidFill>
+              <a:uFill>
+                <a:solidFill>
+                  <a:srgbClr val="FFFFFF"/>
                 </a:solidFill>
               </a:uFill>
               <a:latin typeface="Arial"/>
@@ -280,15 +386,16 @@
           </a:prstGeom>
         </p:spPr>
         <p:txBody>
-          <a:bodyPr lIns="0" rIns="0" tIns="0" bIns="0"/>
-          <a:p>
-            <a:endParaRPr lang="en-CA" sz="3200" spc="-1" strike="noStrike">
-              <a:solidFill>
-                <a:srgbClr val="000000"/>
-              </a:solidFill>
-              <a:uFill>
-                <a:solidFill>
-                  <a:srgbClr val="ffffff"/>
+          <a:bodyPr lIns="0" tIns="0" rIns="0" bIns="0"/>
+          <a:lstStyle/>
+          <a:p>
+            <a:endParaRPr lang="en-CA" sz="3200" strike="noStrike" spc="-1">
+              <a:solidFill>
+                <a:srgbClr val="000000"/>
+              </a:solidFill>
+              <a:uFill>
+                <a:solidFill>
+                  <a:srgbClr val="FFFFFF"/>
                 </a:solidFill>
               </a:uFill>
               <a:latin typeface="Arial"/>
@@ -316,15 +423,16 @@
           </a:prstGeom>
         </p:spPr>
         <p:txBody>
-          <a:bodyPr lIns="0" rIns="0" tIns="0" bIns="0"/>
-          <a:p>
-            <a:endParaRPr lang="en-CA" sz="3200" spc="-1" strike="noStrike">
-              <a:solidFill>
-                <a:srgbClr val="000000"/>
-              </a:solidFill>
-              <a:uFill>
-                <a:solidFill>
-                  <a:srgbClr val="ffffff"/>
+          <a:bodyPr lIns="0" tIns="0" rIns="0" bIns="0"/>
+          <a:lstStyle/>
+          <a:p>
+            <a:endParaRPr lang="en-CA" sz="3200" strike="noStrike" spc="-1">
+              <a:solidFill>
+                <a:srgbClr val="000000"/>
+              </a:solidFill>
+              <a:uFill>
+                <a:solidFill>
+                  <a:srgbClr val="FFFFFF"/>
                 </a:solidFill>
               </a:uFill>
               <a:latin typeface="Arial"/>
@@ -352,15 +460,16 @@
           </a:prstGeom>
         </p:spPr>
         <p:txBody>
-          <a:bodyPr lIns="0" rIns="0" tIns="0" bIns="0"/>
-          <a:p>
-            <a:endParaRPr lang="en-CA" sz="3200" spc="-1" strike="noStrike">
-              <a:solidFill>
-                <a:srgbClr val="000000"/>
-              </a:solidFill>
-              <a:uFill>
-                <a:solidFill>
-                  <a:srgbClr val="ffffff"/>
+          <a:bodyPr lIns="0" tIns="0" rIns="0" bIns="0"/>
+          <a:lstStyle/>
+          <a:p>
+            <a:endParaRPr lang="en-CA" sz="3200" strike="noStrike" spc="-1">
+              <a:solidFill>
+                <a:srgbClr val="000000"/>
+              </a:solidFill>
+              <a:uFill>
+                <a:solidFill>
+                  <a:srgbClr val="FFFFFF"/>
                 </a:solidFill>
               </a:uFill>
               <a:latin typeface="Arial"/>
@@ -370,11 +479,14 @@
       </p:sp>
     </p:spTree>
   </p:cSld>
+  <p:clrMapOvr>
+    <a:masterClrMapping/>
+  </p:clrMapOvr>
 </p:sldLayout>
 </file>
 
 <file path=ppt/slideLayouts/slideLayout12.xml><?xml version="1.0" encoding="utf-8"?>
-<p:sldLayout xmlns:a="http://schemas.openxmlformats.org/drawingml/2006/main" xmlns:p="http://schemas.openxmlformats.org/presentationml/2006/main" xmlns:r="http://schemas.openxmlformats.org/officeDocument/2006/relationships" type="blank" preserve="1">
+<p:sldLayout xmlns:a="http://schemas.openxmlformats.org/drawingml/2006/main" xmlns:r="http://schemas.openxmlformats.org/officeDocument/2006/relationships" xmlns:p="http://schemas.openxmlformats.org/presentationml/2006/main" type="blank" preserve="1">
   <p:cSld name="Title, 6 Content">
     <p:spTree>
       <p:nvGrpSpPr>
@@ -410,16 +522,17 @@
           </a:prstGeom>
         </p:spPr>
         <p:txBody>
-          <a:bodyPr lIns="0" rIns="0" tIns="0" bIns="0" anchor="ctr"/>
+          <a:bodyPr lIns="0" tIns="0" rIns="0" bIns="0" anchor="ctr"/>
+          <a:lstStyle/>
           <a:p>
             <a:pPr algn="ctr"/>
-            <a:endParaRPr lang="en-CA" sz="4400" spc="-1" strike="noStrike">
-              <a:solidFill>
-                <a:srgbClr val="000000"/>
-              </a:solidFill>
-              <a:uFill>
-                <a:solidFill>
-                  <a:srgbClr val="ffffff"/>
+            <a:endParaRPr lang="en-CA" sz="4400" strike="noStrike" spc="-1">
+              <a:solidFill>
+                <a:srgbClr val="000000"/>
+              </a:solidFill>
+              <a:uFill>
+                <a:solidFill>
+                  <a:srgbClr val="FFFFFF"/>
                 </a:solidFill>
               </a:uFill>
               <a:latin typeface="Arial"/>
@@ -447,15 +560,16 @@
           </a:prstGeom>
         </p:spPr>
         <p:txBody>
-          <a:bodyPr lIns="0" rIns="0" tIns="0" bIns="0"/>
-          <a:p>
-            <a:endParaRPr lang="en-CA" sz="3200" spc="-1" strike="noStrike">
-              <a:solidFill>
-                <a:srgbClr val="000000"/>
-              </a:solidFill>
-              <a:uFill>
-                <a:solidFill>
-                  <a:srgbClr val="ffffff"/>
+          <a:bodyPr lIns="0" tIns="0" rIns="0" bIns="0"/>
+          <a:lstStyle/>
+          <a:p>
+            <a:endParaRPr lang="en-CA" sz="3200" strike="noStrike" spc="-1">
+              <a:solidFill>
+                <a:srgbClr val="000000"/>
+              </a:solidFill>
+              <a:uFill>
+                <a:solidFill>
+                  <a:srgbClr val="FFFFFF"/>
                 </a:solidFill>
               </a:uFill>
               <a:latin typeface="Arial"/>
@@ -483,15 +597,16 @@
           </a:prstGeom>
         </p:spPr>
         <p:txBody>
-          <a:bodyPr lIns="0" rIns="0" tIns="0" bIns="0"/>
-          <a:p>
-            <a:endParaRPr lang="en-CA" sz="3200" spc="-1" strike="noStrike">
-              <a:solidFill>
-                <a:srgbClr val="000000"/>
-              </a:solidFill>
-              <a:uFill>
-                <a:solidFill>
-                  <a:srgbClr val="ffffff"/>
+          <a:bodyPr lIns="0" tIns="0" rIns="0" bIns="0"/>
+          <a:lstStyle/>
+          <a:p>
+            <a:endParaRPr lang="en-CA" sz="3200" strike="noStrike" spc="-1">
+              <a:solidFill>
+                <a:srgbClr val="000000"/>
+              </a:solidFill>
+              <a:uFill>
+                <a:solidFill>
+                  <a:srgbClr val="FFFFFF"/>
                 </a:solidFill>
               </a:uFill>
               <a:latin typeface="Arial"/>
@@ -501,7 +616,7 @@
       </p:sp>
       <p:pic>
         <p:nvPicPr>
-          <p:cNvPr id="36" name="" descr=""/>
+          <p:cNvPr id="36" name="Picture 35"/>
           <p:cNvPicPr/>
           <p:nvPr/>
         </p:nvPicPr>
@@ -524,12 +639,12 @@
       </p:pic>
       <p:pic>
         <p:nvPicPr>
-          <p:cNvPr id="37" name="" descr=""/>
+          <p:cNvPr id="37" name="Picture 36"/>
           <p:cNvPicPr/>
           <p:nvPr/>
         </p:nvPicPr>
         <p:blipFill>
-          <a:blip r:embed="rId3"/>
+          <a:blip r:embed="rId2"/>
           <a:stretch/>
         </p:blipFill>
         <p:spPr>
@@ -547,11 +662,14 @@
       </p:pic>
     </p:spTree>
   </p:cSld>
+  <p:clrMapOvr>
+    <a:masterClrMapping/>
+  </p:clrMapOvr>
 </p:sldLayout>
 </file>
 
 <file path=ppt/slideLayouts/slideLayout2.xml><?xml version="1.0" encoding="utf-8"?>
-<p:sldLayout xmlns:a="http://schemas.openxmlformats.org/drawingml/2006/main" xmlns:p="http://schemas.openxmlformats.org/presentationml/2006/main" xmlns:r="http://schemas.openxmlformats.org/officeDocument/2006/relationships" type="tx" preserve="1">
+<p:sldLayout xmlns:a="http://schemas.openxmlformats.org/drawingml/2006/main" xmlns:r="http://schemas.openxmlformats.org/officeDocument/2006/relationships" xmlns:p="http://schemas.openxmlformats.org/presentationml/2006/main" type="tx" preserve="1">
   <p:cSld name="Title Slide">
     <p:spTree>
       <p:nvGrpSpPr>
@@ -587,16 +705,17 @@
           </a:prstGeom>
         </p:spPr>
         <p:txBody>
-          <a:bodyPr lIns="0" rIns="0" tIns="0" bIns="0" anchor="ctr"/>
+          <a:bodyPr lIns="0" tIns="0" rIns="0" bIns="0" anchor="ctr"/>
+          <a:lstStyle/>
           <a:p>
             <a:pPr algn="ctr"/>
-            <a:endParaRPr lang="en-CA" sz="4400" spc="-1" strike="noStrike">
-              <a:solidFill>
-                <a:srgbClr val="000000"/>
-              </a:solidFill>
-              <a:uFill>
-                <a:solidFill>
-                  <a:srgbClr val="ffffff"/>
+            <a:endParaRPr lang="en-CA" sz="4400" strike="noStrike" spc="-1">
+              <a:solidFill>
+                <a:srgbClr val="000000"/>
+              </a:solidFill>
+              <a:uFill>
+                <a:solidFill>
+                  <a:srgbClr val="FFFFFF"/>
                 </a:solidFill>
               </a:uFill>
               <a:latin typeface="Arial"/>
@@ -624,16 +743,17 @@
           </a:prstGeom>
         </p:spPr>
         <p:txBody>
-          <a:bodyPr lIns="0" rIns="0" tIns="0" bIns="0" anchor="ctr"/>
+          <a:bodyPr lIns="0" tIns="0" rIns="0" bIns="0" anchor="ctr"/>
+          <a:lstStyle/>
           <a:p>
             <a:pPr algn="ctr"/>
-            <a:endParaRPr lang="en-CA" sz="3200" spc="-1" strike="noStrike">
-              <a:solidFill>
-                <a:srgbClr val="000000"/>
-              </a:solidFill>
-              <a:uFill>
-                <a:solidFill>
-                  <a:srgbClr val="ffffff"/>
+            <a:endParaRPr lang="en-CA" sz="3200" strike="noStrike" spc="-1">
+              <a:solidFill>
+                <a:srgbClr val="000000"/>
+              </a:solidFill>
+              <a:uFill>
+                <a:solidFill>
+                  <a:srgbClr val="FFFFFF"/>
                 </a:solidFill>
               </a:uFill>
               <a:latin typeface="Arial"/>
@@ -643,11 +763,14 @@
       </p:sp>
     </p:spTree>
   </p:cSld>
+  <p:clrMapOvr>
+    <a:masterClrMapping/>
+  </p:clrMapOvr>
 </p:sldLayout>
 </file>
 
 <file path=ppt/slideLayouts/slideLayout3.xml><?xml version="1.0" encoding="utf-8"?>
-<p:sldLayout xmlns:a="http://schemas.openxmlformats.org/drawingml/2006/main" xmlns:p="http://schemas.openxmlformats.org/presentationml/2006/main" xmlns:r="http://schemas.openxmlformats.org/officeDocument/2006/relationships" type="obj" preserve="1">
+<p:sldLayout xmlns:a="http://schemas.openxmlformats.org/drawingml/2006/main" xmlns:r="http://schemas.openxmlformats.org/officeDocument/2006/relationships" xmlns:p="http://schemas.openxmlformats.org/presentationml/2006/main" type="obj" preserve="1">
   <p:cSld name="Title, Content">
     <p:spTree>
       <p:nvGrpSpPr>
@@ -683,16 +806,17 @@
           </a:prstGeom>
         </p:spPr>
         <p:txBody>
-          <a:bodyPr lIns="0" rIns="0" tIns="0" bIns="0" anchor="ctr"/>
+          <a:bodyPr lIns="0" tIns="0" rIns="0" bIns="0" anchor="ctr"/>
+          <a:lstStyle/>
           <a:p>
             <a:pPr algn="ctr"/>
-            <a:endParaRPr lang="en-CA" sz="4400" spc="-1" strike="noStrike">
-              <a:solidFill>
-                <a:srgbClr val="000000"/>
-              </a:solidFill>
-              <a:uFill>
-                <a:solidFill>
-                  <a:srgbClr val="ffffff"/>
+            <a:endParaRPr lang="en-CA" sz="4400" strike="noStrike" spc="-1">
+              <a:solidFill>
+                <a:srgbClr val="000000"/>
+              </a:solidFill>
+              <a:uFill>
+                <a:solidFill>
+                  <a:srgbClr val="FFFFFF"/>
                 </a:solidFill>
               </a:uFill>
               <a:latin typeface="Arial"/>
@@ -720,15 +844,16 @@
           </a:prstGeom>
         </p:spPr>
         <p:txBody>
-          <a:bodyPr lIns="0" rIns="0" tIns="0" bIns="0"/>
-          <a:p>
-            <a:endParaRPr lang="en-CA" sz="3200" spc="-1" strike="noStrike">
-              <a:solidFill>
-                <a:srgbClr val="000000"/>
-              </a:solidFill>
-              <a:uFill>
-                <a:solidFill>
-                  <a:srgbClr val="ffffff"/>
+          <a:bodyPr lIns="0" tIns="0" rIns="0" bIns="0"/>
+          <a:lstStyle/>
+          <a:p>
+            <a:endParaRPr lang="en-CA" sz="3200" strike="noStrike" spc="-1">
+              <a:solidFill>
+                <a:srgbClr val="000000"/>
+              </a:solidFill>
+              <a:uFill>
+                <a:solidFill>
+                  <a:srgbClr val="FFFFFF"/>
                 </a:solidFill>
               </a:uFill>
               <a:latin typeface="Arial"/>
@@ -738,11 +863,14 @@
       </p:sp>
     </p:spTree>
   </p:cSld>
+  <p:clrMapOvr>
+    <a:masterClrMapping/>
+  </p:clrMapOvr>
 </p:sldLayout>
 </file>
 
 <file path=ppt/slideLayouts/slideLayout4.xml><?xml version="1.0" encoding="utf-8"?>
-<p:sldLayout xmlns:a="http://schemas.openxmlformats.org/drawingml/2006/main" xmlns:p="http://schemas.openxmlformats.org/presentationml/2006/main" xmlns:r="http://schemas.openxmlformats.org/officeDocument/2006/relationships" type="twoObj" preserve="1">
+<p:sldLayout xmlns:a="http://schemas.openxmlformats.org/drawingml/2006/main" xmlns:r="http://schemas.openxmlformats.org/officeDocument/2006/relationships" xmlns:p="http://schemas.openxmlformats.org/presentationml/2006/main" type="twoObj" preserve="1">
   <p:cSld name="Title, 2 Content">
     <p:spTree>
       <p:nvGrpSpPr>
@@ -778,16 +906,17 @@
           </a:prstGeom>
         </p:spPr>
         <p:txBody>
-          <a:bodyPr lIns="0" rIns="0" tIns="0" bIns="0" anchor="ctr"/>
+          <a:bodyPr lIns="0" tIns="0" rIns="0" bIns="0" anchor="ctr"/>
+          <a:lstStyle/>
           <a:p>
             <a:pPr algn="ctr"/>
-            <a:endParaRPr lang="en-CA" sz="4400" spc="-1" strike="noStrike">
-              <a:solidFill>
-                <a:srgbClr val="000000"/>
-              </a:solidFill>
-              <a:uFill>
-                <a:solidFill>
-                  <a:srgbClr val="ffffff"/>
+            <a:endParaRPr lang="en-CA" sz="4400" strike="noStrike" spc="-1">
+              <a:solidFill>
+                <a:srgbClr val="000000"/>
+              </a:solidFill>
+              <a:uFill>
+                <a:solidFill>
+                  <a:srgbClr val="FFFFFF"/>
                 </a:solidFill>
               </a:uFill>
               <a:latin typeface="Arial"/>
@@ -815,15 +944,16 @@
           </a:prstGeom>
         </p:spPr>
         <p:txBody>
-          <a:bodyPr lIns="0" rIns="0" tIns="0" bIns="0"/>
-          <a:p>
-            <a:endParaRPr lang="en-CA" sz="3200" spc="-1" strike="noStrike">
-              <a:solidFill>
-                <a:srgbClr val="000000"/>
-              </a:solidFill>
-              <a:uFill>
-                <a:solidFill>
-                  <a:srgbClr val="ffffff"/>
+          <a:bodyPr lIns="0" tIns="0" rIns="0" bIns="0"/>
+          <a:lstStyle/>
+          <a:p>
+            <a:endParaRPr lang="en-CA" sz="3200" strike="noStrike" spc="-1">
+              <a:solidFill>
+                <a:srgbClr val="000000"/>
+              </a:solidFill>
+              <a:uFill>
+                <a:solidFill>
+                  <a:srgbClr val="FFFFFF"/>
                 </a:solidFill>
               </a:uFill>
               <a:latin typeface="Arial"/>
@@ -851,15 +981,16 @@
           </a:prstGeom>
         </p:spPr>
         <p:txBody>
-          <a:bodyPr lIns="0" rIns="0" tIns="0" bIns="0"/>
-          <a:p>
-            <a:endParaRPr lang="en-CA" sz="3200" spc="-1" strike="noStrike">
-              <a:solidFill>
-                <a:srgbClr val="000000"/>
-              </a:solidFill>
-              <a:uFill>
-                <a:solidFill>
-                  <a:srgbClr val="ffffff"/>
+          <a:bodyPr lIns="0" tIns="0" rIns="0" bIns="0"/>
+          <a:lstStyle/>
+          <a:p>
+            <a:endParaRPr lang="en-CA" sz="3200" strike="noStrike" spc="-1">
+              <a:solidFill>
+                <a:srgbClr val="000000"/>
+              </a:solidFill>
+              <a:uFill>
+                <a:solidFill>
+                  <a:srgbClr val="FFFFFF"/>
                 </a:solidFill>
               </a:uFill>
               <a:latin typeface="Arial"/>
@@ -869,11 +1000,14 @@
       </p:sp>
     </p:spTree>
   </p:cSld>
+  <p:clrMapOvr>
+    <a:masterClrMapping/>
+  </p:clrMapOvr>
 </p:sldLayout>
 </file>
 
 <file path=ppt/slideLayouts/slideLayout5.xml><?xml version="1.0" encoding="utf-8"?>
-<p:sldLayout xmlns:a="http://schemas.openxmlformats.org/drawingml/2006/main" xmlns:p="http://schemas.openxmlformats.org/presentationml/2006/main" xmlns:r="http://schemas.openxmlformats.org/officeDocument/2006/relationships" type="titleOnly" preserve="1">
+<p:sldLayout xmlns:a="http://schemas.openxmlformats.org/drawingml/2006/main" xmlns:r="http://schemas.openxmlformats.org/officeDocument/2006/relationships" xmlns:p="http://schemas.openxmlformats.org/presentationml/2006/main" type="titleOnly" preserve="1">
   <p:cSld name="Title Only">
     <p:spTree>
       <p:nvGrpSpPr>
@@ -909,16 +1043,17 @@
           </a:prstGeom>
         </p:spPr>
         <p:txBody>
-          <a:bodyPr lIns="0" rIns="0" tIns="0" bIns="0" anchor="ctr"/>
+          <a:bodyPr lIns="0" tIns="0" rIns="0" bIns="0" anchor="ctr"/>
+          <a:lstStyle/>
           <a:p>
             <a:pPr algn="ctr"/>
-            <a:endParaRPr lang="en-CA" sz="4400" spc="-1" strike="noStrike">
-              <a:solidFill>
-                <a:srgbClr val="000000"/>
-              </a:solidFill>
-              <a:uFill>
-                <a:solidFill>
-                  <a:srgbClr val="ffffff"/>
+            <a:endParaRPr lang="en-CA" sz="4400" strike="noStrike" spc="-1">
+              <a:solidFill>
+                <a:srgbClr val="000000"/>
+              </a:solidFill>
+              <a:uFill>
+                <a:solidFill>
+                  <a:srgbClr val="FFFFFF"/>
                 </a:solidFill>
               </a:uFill>
               <a:latin typeface="Arial"/>
@@ -928,11 +1063,14 @@
       </p:sp>
     </p:spTree>
   </p:cSld>
+  <p:clrMapOvr>
+    <a:masterClrMapping/>
+  </p:clrMapOvr>
 </p:sldLayout>
 </file>
 
 <file path=ppt/slideLayouts/slideLayout6.xml><?xml version="1.0" encoding="utf-8"?>
-<p:sldLayout xmlns:a="http://schemas.openxmlformats.org/drawingml/2006/main" xmlns:p="http://schemas.openxmlformats.org/presentationml/2006/main" xmlns:r="http://schemas.openxmlformats.org/officeDocument/2006/relationships" type="objOnly" preserve="1">
+<p:sldLayout xmlns:a="http://schemas.openxmlformats.org/drawingml/2006/main" xmlns:r="http://schemas.openxmlformats.org/officeDocument/2006/relationships" xmlns:p="http://schemas.openxmlformats.org/presentationml/2006/main" type="objOnly" preserve="1">
   <p:cSld name="Centered Text">
     <p:spTree>
       <p:nvGrpSpPr>
@@ -968,16 +1106,17 @@
           </a:prstGeom>
         </p:spPr>
         <p:txBody>
-          <a:bodyPr lIns="0" rIns="0" tIns="0" bIns="0" anchor="ctr"/>
+          <a:bodyPr lIns="0" tIns="0" rIns="0" bIns="0" anchor="ctr"/>
+          <a:lstStyle/>
           <a:p>
             <a:pPr algn="ctr"/>
-            <a:endParaRPr lang="en-CA" sz="3200" spc="-1" strike="noStrike">
-              <a:solidFill>
-                <a:srgbClr val="000000"/>
-              </a:solidFill>
-              <a:uFill>
-                <a:solidFill>
-                  <a:srgbClr val="ffffff"/>
+            <a:endParaRPr lang="en-CA" sz="3200" strike="noStrike" spc="-1">
+              <a:solidFill>
+                <a:srgbClr val="000000"/>
+              </a:solidFill>
+              <a:uFill>
+                <a:solidFill>
+                  <a:srgbClr val="FFFFFF"/>
                 </a:solidFill>
               </a:uFill>
               <a:latin typeface="Arial"/>
@@ -987,11 +1126,14 @@
       </p:sp>
     </p:spTree>
   </p:cSld>
+  <p:clrMapOvr>
+    <a:masterClrMapping/>
+  </p:clrMapOvr>
 </p:sldLayout>
 </file>
 
 <file path=ppt/slideLayouts/slideLayout7.xml><?xml version="1.0" encoding="utf-8"?>
-<p:sldLayout xmlns:a="http://schemas.openxmlformats.org/drawingml/2006/main" xmlns:p="http://schemas.openxmlformats.org/presentationml/2006/main" xmlns:r="http://schemas.openxmlformats.org/officeDocument/2006/relationships" type="twoObjAndObj" preserve="1">
+<p:sldLayout xmlns:a="http://schemas.openxmlformats.org/drawingml/2006/main" xmlns:r="http://schemas.openxmlformats.org/officeDocument/2006/relationships" xmlns:p="http://schemas.openxmlformats.org/presentationml/2006/main" type="twoObjAndObj" preserve="1">
   <p:cSld name="Title, 2 Content and Content">
     <p:spTree>
       <p:nvGrpSpPr>
@@ -1027,16 +1169,17 @@
           </a:prstGeom>
         </p:spPr>
         <p:txBody>
-          <a:bodyPr lIns="0" rIns="0" tIns="0" bIns="0" anchor="ctr"/>
+          <a:bodyPr lIns="0" tIns="0" rIns="0" bIns="0" anchor="ctr"/>
+          <a:lstStyle/>
           <a:p>
             <a:pPr algn="ctr"/>
-            <a:endParaRPr lang="en-CA" sz="4400" spc="-1" strike="noStrike">
-              <a:solidFill>
-                <a:srgbClr val="000000"/>
-              </a:solidFill>
-              <a:uFill>
-                <a:solidFill>
-                  <a:srgbClr val="ffffff"/>
+            <a:endParaRPr lang="en-CA" sz="4400" strike="noStrike" spc="-1">
+              <a:solidFill>
+                <a:srgbClr val="000000"/>
+              </a:solidFill>
+              <a:uFill>
+                <a:solidFill>
+                  <a:srgbClr val="FFFFFF"/>
                 </a:solidFill>
               </a:uFill>
               <a:latin typeface="Arial"/>
@@ -1064,15 +1207,16 @@
           </a:prstGeom>
         </p:spPr>
         <p:txBody>
-          <a:bodyPr lIns="0" rIns="0" tIns="0" bIns="0"/>
-          <a:p>
-            <a:endParaRPr lang="en-CA" sz="3200" spc="-1" strike="noStrike">
-              <a:solidFill>
-                <a:srgbClr val="000000"/>
-              </a:solidFill>
-              <a:uFill>
-                <a:solidFill>
-                  <a:srgbClr val="ffffff"/>
+          <a:bodyPr lIns="0" tIns="0" rIns="0" bIns="0"/>
+          <a:lstStyle/>
+          <a:p>
+            <a:endParaRPr lang="en-CA" sz="3200" strike="noStrike" spc="-1">
+              <a:solidFill>
+                <a:srgbClr val="000000"/>
+              </a:solidFill>
+              <a:uFill>
+                <a:solidFill>
+                  <a:srgbClr val="FFFFFF"/>
                 </a:solidFill>
               </a:uFill>
               <a:latin typeface="Arial"/>
@@ -1100,15 +1244,16 @@
           </a:prstGeom>
         </p:spPr>
         <p:txBody>
-          <a:bodyPr lIns="0" rIns="0" tIns="0" bIns="0"/>
-          <a:p>
-            <a:endParaRPr lang="en-CA" sz="3200" spc="-1" strike="noStrike">
-              <a:solidFill>
-                <a:srgbClr val="000000"/>
-              </a:solidFill>
-              <a:uFill>
-                <a:solidFill>
-                  <a:srgbClr val="ffffff"/>
+          <a:bodyPr lIns="0" tIns="0" rIns="0" bIns="0"/>
+          <a:lstStyle/>
+          <a:p>
+            <a:endParaRPr lang="en-CA" sz="3200" strike="noStrike" spc="-1">
+              <a:solidFill>
+                <a:srgbClr val="000000"/>
+              </a:solidFill>
+              <a:uFill>
+                <a:solidFill>
+                  <a:srgbClr val="FFFFFF"/>
                 </a:solidFill>
               </a:uFill>
               <a:latin typeface="Arial"/>
@@ -1136,15 +1281,16 @@
           </a:prstGeom>
         </p:spPr>
         <p:txBody>
-          <a:bodyPr lIns="0" rIns="0" tIns="0" bIns="0"/>
-          <a:p>
-            <a:endParaRPr lang="en-CA" sz="3200" spc="-1" strike="noStrike">
-              <a:solidFill>
-                <a:srgbClr val="000000"/>
-              </a:solidFill>
-              <a:uFill>
-                <a:solidFill>
-                  <a:srgbClr val="ffffff"/>
+          <a:bodyPr lIns="0" tIns="0" rIns="0" bIns="0"/>
+          <a:lstStyle/>
+          <a:p>
+            <a:endParaRPr lang="en-CA" sz="3200" strike="noStrike" spc="-1">
+              <a:solidFill>
+                <a:srgbClr val="000000"/>
+              </a:solidFill>
+              <a:uFill>
+                <a:solidFill>
+                  <a:srgbClr val="FFFFFF"/>
                 </a:solidFill>
               </a:uFill>
               <a:latin typeface="Arial"/>
@@ -1154,11 +1300,14 @@
       </p:sp>
     </p:spTree>
   </p:cSld>
+  <p:clrMapOvr>
+    <a:masterClrMapping/>
+  </p:clrMapOvr>
 </p:sldLayout>
 </file>
 
 <file path=ppt/slideLayouts/slideLayout8.xml><?xml version="1.0" encoding="utf-8"?>
-<p:sldLayout xmlns:a="http://schemas.openxmlformats.org/drawingml/2006/main" xmlns:p="http://schemas.openxmlformats.org/presentationml/2006/main" xmlns:r="http://schemas.openxmlformats.org/officeDocument/2006/relationships" type="objAndTwoObj" preserve="1">
+<p:sldLayout xmlns:a="http://schemas.openxmlformats.org/drawingml/2006/main" xmlns:r="http://schemas.openxmlformats.org/officeDocument/2006/relationships" xmlns:p="http://schemas.openxmlformats.org/presentationml/2006/main" type="objAndTwoObj" preserve="1">
   <p:cSld name="Title Content and 2 Content">
     <p:spTree>
       <p:nvGrpSpPr>
@@ -1194,16 +1343,17 @@
           </a:prstGeom>
         </p:spPr>
         <p:txBody>
-          <a:bodyPr lIns="0" rIns="0" tIns="0" bIns="0" anchor="ctr"/>
+          <a:bodyPr lIns="0" tIns="0" rIns="0" bIns="0" anchor="ctr"/>
+          <a:lstStyle/>
           <a:p>
             <a:pPr algn="ctr"/>
-            <a:endParaRPr lang="en-CA" sz="4400" spc="-1" strike="noStrike">
-              <a:solidFill>
-                <a:srgbClr val="000000"/>
-              </a:solidFill>
-              <a:uFill>
-                <a:solidFill>
-                  <a:srgbClr val="ffffff"/>
+            <a:endParaRPr lang="en-CA" sz="4400" strike="noStrike" spc="-1">
+              <a:solidFill>
+                <a:srgbClr val="000000"/>
+              </a:solidFill>
+              <a:uFill>
+                <a:solidFill>
+                  <a:srgbClr val="FFFFFF"/>
                 </a:solidFill>
               </a:uFill>
               <a:latin typeface="Arial"/>
@@ -1231,15 +1381,16 @@
           </a:prstGeom>
         </p:spPr>
         <p:txBody>
-          <a:bodyPr lIns="0" rIns="0" tIns="0" bIns="0"/>
-          <a:p>
-            <a:endParaRPr lang="en-CA" sz="3200" spc="-1" strike="noStrike">
-              <a:solidFill>
-                <a:srgbClr val="000000"/>
-              </a:solidFill>
-              <a:uFill>
-                <a:solidFill>
-                  <a:srgbClr val="ffffff"/>
+          <a:bodyPr lIns="0" tIns="0" rIns="0" bIns="0"/>
+          <a:lstStyle/>
+          <a:p>
+            <a:endParaRPr lang="en-CA" sz="3200" strike="noStrike" spc="-1">
+              <a:solidFill>
+                <a:srgbClr val="000000"/>
+              </a:solidFill>
+              <a:uFill>
+                <a:solidFill>
+                  <a:srgbClr val="FFFFFF"/>
                 </a:solidFill>
               </a:uFill>
               <a:latin typeface="Arial"/>
@@ -1267,15 +1418,16 @@
           </a:prstGeom>
         </p:spPr>
         <p:txBody>
-          <a:bodyPr lIns="0" rIns="0" tIns="0" bIns="0"/>
-          <a:p>
-            <a:endParaRPr lang="en-CA" sz="3200" spc="-1" strike="noStrike">
-              <a:solidFill>
-                <a:srgbClr val="000000"/>
-              </a:solidFill>
-              <a:uFill>
-                <a:solidFill>
-                  <a:srgbClr val="ffffff"/>
+          <a:bodyPr lIns="0" tIns="0" rIns="0" bIns="0"/>
+          <a:lstStyle/>
+          <a:p>
+            <a:endParaRPr lang="en-CA" sz="3200" strike="noStrike" spc="-1">
+              <a:solidFill>
+                <a:srgbClr val="000000"/>
+              </a:solidFill>
+              <a:uFill>
+                <a:solidFill>
+                  <a:srgbClr val="FFFFFF"/>
                 </a:solidFill>
               </a:uFill>
               <a:latin typeface="Arial"/>
@@ -1303,15 +1455,16 @@
           </a:prstGeom>
         </p:spPr>
         <p:txBody>
-          <a:bodyPr lIns="0" rIns="0" tIns="0" bIns="0"/>
-          <a:p>
-            <a:endParaRPr lang="en-CA" sz="3200" spc="-1" strike="noStrike">
-              <a:solidFill>
-                <a:srgbClr val="000000"/>
-              </a:solidFill>
-              <a:uFill>
-                <a:solidFill>
-                  <a:srgbClr val="ffffff"/>
+          <a:bodyPr lIns="0" tIns="0" rIns="0" bIns="0"/>
+          <a:lstStyle/>
+          <a:p>
+            <a:endParaRPr lang="en-CA" sz="3200" strike="noStrike" spc="-1">
+              <a:solidFill>
+                <a:srgbClr val="000000"/>
+              </a:solidFill>
+              <a:uFill>
+                <a:solidFill>
+                  <a:srgbClr val="FFFFFF"/>
                 </a:solidFill>
               </a:uFill>
               <a:latin typeface="Arial"/>
@@ -1321,11 +1474,14 @@
       </p:sp>
     </p:spTree>
   </p:cSld>
+  <p:clrMapOvr>
+    <a:masterClrMapping/>
+  </p:clrMapOvr>
 </p:sldLayout>
 </file>
 
 <file path=ppt/slideLayouts/slideLayout9.xml><?xml version="1.0" encoding="utf-8"?>
-<p:sldLayout xmlns:a="http://schemas.openxmlformats.org/drawingml/2006/main" xmlns:p="http://schemas.openxmlformats.org/presentationml/2006/main" xmlns:r="http://schemas.openxmlformats.org/officeDocument/2006/relationships" type="twoObjOverTx" preserve="1">
+<p:sldLayout xmlns:a="http://schemas.openxmlformats.org/drawingml/2006/main" xmlns:r="http://schemas.openxmlformats.org/officeDocument/2006/relationships" xmlns:p="http://schemas.openxmlformats.org/presentationml/2006/main" type="twoObjOverTx" preserve="1">
   <p:cSld name="Title, 2 Content over Content">
     <p:spTree>
       <p:nvGrpSpPr>
@@ -1361,16 +1517,17 @@
           </a:prstGeom>
         </p:spPr>
         <p:txBody>
-          <a:bodyPr lIns="0" rIns="0" tIns="0" bIns="0" anchor="ctr"/>
+          <a:bodyPr lIns="0" tIns="0" rIns="0" bIns="0" anchor="ctr"/>
+          <a:lstStyle/>
           <a:p>
             <a:pPr algn="ctr"/>
-            <a:endParaRPr lang="en-CA" sz="4400" spc="-1" strike="noStrike">
-              <a:solidFill>
-                <a:srgbClr val="000000"/>
-              </a:solidFill>
-              <a:uFill>
-                <a:solidFill>
-                  <a:srgbClr val="ffffff"/>
+            <a:endParaRPr lang="en-CA" sz="4400" strike="noStrike" spc="-1">
+              <a:solidFill>
+                <a:srgbClr val="000000"/>
+              </a:solidFill>
+              <a:uFill>
+                <a:solidFill>
+                  <a:srgbClr val="FFFFFF"/>
                 </a:solidFill>
               </a:uFill>
               <a:latin typeface="Arial"/>
@@ -1398,15 +1555,16 @@
           </a:prstGeom>
         </p:spPr>
         <p:txBody>
-          <a:bodyPr lIns="0" rIns="0" tIns="0" bIns="0"/>
-          <a:p>
-            <a:endParaRPr lang="en-CA" sz="3200" spc="-1" strike="noStrike">
-              <a:solidFill>
-                <a:srgbClr val="000000"/>
-              </a:solidFill>
-              <a:uFill>
-                <a:solidFill>
-                  <a:srgbClr val="ffffff"/>
+          <a:bodyPr lIns="0" tIns="0" rIns="0" bIns="0"/>
+          <a:lstStyle/>
+          <a:p>
+            <a:endParaRPr lang="en-CA" sz="3200" strike="noStrike" spc="-1">
+              <a:solidFill>
+                <a:srgbClr val="000000"/>
+              </a:solidFill>
+              <a:uFill>
+                <a:solidFill>
+                  <a:srgbClr val="FFFFFF"/>
                 </a:solidFill>
               </a:uFill>
               <a:latin typeface="Arial"/>
@@ -1434,15 +1592,16 @@
           </a:prstGeom>
         </p:spPr>
         <p:txBody>
-          <a:bodyPr lIns="0" rIns="0" tIns="0" bIns="0"/>
-          <a:p>
-            <a:endParaRPr lang="en-CA" sz="3200" spc="-1" strike="noStrike">
-              <a:solidFill>
-                <a:srgbClr val="000000"/>
-              </a:solidFill>
-              <a:uFill>
-                <a:solidFill>
-                  <a:srgbClr val="ffffff"/>
+          <a:bodyPr lIns="0" tIns="0" rIns="0" bIns="0"/>
+          <a:lstStyle/>
+          <a:p>
+            <a:endParaRPr lang="en-CA" sz="3200" strike="noStrike" spc="-1">
+              <a:solidFill>
+                <a:srgbClr val="000000"/>
+              </a:solidFill>
+              <a:uFill>
+                <a:solidFill>
+                  <a:srgbClr val="FFFFFF"/>
                 </a:solidFill>
               </a:uFill>
               <a:latin typeface="Arial"/>
@@ -1470,15 +1629,16 @@
           </a:prstGeom>
         </p:spPr>
         <p:txBody>
-          <a:bodyPr lIns="0" rIns="0" tIns="0" bIns="0"/>
-          <a:p>
-            <a:endParaRPr lang="en-CA" sz="3200" spc="-1" strike="noStrike">
-              <a:solidFill>
-                <a:srgbClr val="000000"/>
-              </a:solidFill>
-              <a:uFill>
-                <a:solidFill>
-                  <a:srgbClr val="ffffff"/>
+          <a:bodyPr lIns="0" tIns="0" rIns="0" bIns="0"/>
+          <a:lstStyle/>
+          <a:p>
+            <a:endParaRPr lang="en-CA" sz="3200" strike="noStrike" spc="-1">
+              <a:solidFill>
+                <a:srgbClr val="000000"/>
+              </a:solidFill>
+              <a:uFill>
+                <a:solidFill>
+                  <a:srgbClr val="FFFFFF"/>
                 </a:solidFill>
               </a:uFill>
               <a:latin typeface="Arial"/>
@@ -1488,17 +1648,21 @@
       </p:sp>
     </p:spTree>
   </p:cSld>
+  <p:clrMapOvr>
+    <a:masterClrMapping/>
+  </p:clrMapOvr>
 </p:sldLayout>
 </file>
 
 <file path=ppt/slideMasters/slideMaster1.xml><?xml version="1.0" encoding="utf-8"?>
-<p:sldMaster xmlns:a="http://schemas.openxmlformats.org/drawingml/2006/main" xmlns:p="http://schemas.openxmlformats.org/presentationml/2006/main" xmlns:r="http://schemas.openxmlformats.org/officeDocument/2006/relationships">
+<p:sldMaster xmlns:a="http://schemas.openxmlformats.org/drawingml/2006/main" xmlns:r="http://schemas.openxmlformats.org/officeDocument/2006/relationships" xmlns:p="http://schemas.openxmlformats.org/presentationml/2006/main">
   <p:cSld>
     <p:bg>
       <p:bgPr>
         <a:solidFill>
-          <a:srgbClr val="dddddd"/>
+          <a:srgbClr val="DDDDDD"/>
         </a:solidFill>
+        <a:effectLst/>
       </p:bgPr>
     </p:bg>
     <p:spTree>
@@ -1517,7 +1681,7 @@
       </p:grpSpPr>
       <p:sp>
         <p:nvSpPr>
-          <p:cNvPr id="0" name="CustomShape 1"/>
+          <p:cNvPr id="4" name="CustomShape 1"/>
           <p:cNvSpPr/>
           <p:nvPr/>
         </p:nvSpPr>
@@ -1534,20 +1698,26 @@
           </a:solidFill>
           <a:ln>
             <a:solidFill>
-              <a:srgbClr val="ff0000"/>
+              <a:srgbClr val="FF0000"/>
             </a:solidFill>
           </a:ln>
         </p:spPr>
         <p:style>
-          <a:lnRef idx="0"/>
-          <a:fillRef idx="0"/>
-          <a:effectRef idx="0"/>
+          <a:lnRef idx="0">
+            <a:scrgbClr r="0" g="0" b="0"/>
+          </a:lnRef>
+          <a:fillRef idx="0">
+            <a:scrgbClr r="0" g="0" b="0"/>
+          </a:fillRef>
+          <a:effectRef idx="0">
+            <a:scrgbClr r="0" g="0" b="0"/>
+          </a:effectRef>
           <a:fontRef idx="minor"/>
         </p:style>
       </p:sp>
       <p:sp>
         <p:nvSpPr>
-          <p:cNvPr id="1" name="PlaceHolder 2"/>
+          <p:cNvPr id="5" name="PlaceHolder 2"/>
           <p:cNvSpPr>
             <a:spLocks noGrp="1"/>
           </p:cNvSpPr>
@@ -1565,16 +1735,17 @@
           </a:prstGeom>
         </p:spPr>
         <p:txBody>
-          <a:bodyPr lIns="0" rIns="0" tIns="0" bIns="0" anchor="ctr"/>
+          <a:bodyPr lIns="0" tIns="0" rIns="0" bIns="0" anchor="ctr"/>
+          <a:lstStyle/>
           <a:p>
             <a:pPr algn="ctr"/>
-            <a:endParaRPr lang="en-CA" sz="4400" spc="-1" strike="noStrike">
-              <a:solidFill>
-                <a:srgbClr val="000000"/>
-              </a:solidFill>
-              <a:uFill>
-                <a:solidFill>
-                  <a:srgbClr val="ffffff"/>
+            <a:endParaRPr lang="en-CA" sz="4400" strike="noStrike" spc="-1">
+              <a:solidFill>
+                <a:srgbClr val="000000"/>
+              </a:solidFill>
+              <a:uFill>
+                <a:solidFill>
+                  <a:srgbClr val="FFFFFF"/>
                 </a:solidFill>
               </a:uFill>
               <a:latin typeface="Arial"/>
@@ -1602,7 +1773,8 @@
           </a:prstGeom>
         </p:spPr>
         <p:txBody>
-          <a:bodyPr lIns="0" rIns="0" tIns="0" bIns="0"/>
+          <a:bodyPr lIns="0" tIns="0" rIns="0" bIns="0"/>
+          <a:lstStyle/>
           <a:p>
             <a:pPr marL="432000" indent="-324000">
               <a:buClr>
@@ -1613,33 +1785,22 @@
               <a:buChar char=""/>
             </a:pPr>
             <a:r>
-              <a:rPr lang="en-CA" sz="1800" spc="-1" strike="noStrike">
+              <a:rPr lang="en-CA" sz="1800" strike="noStrike" spc="-1">
                 <a:solidFill>
                   <a:srgbClr val="000000"/>
                 </a:solidFill>
                 <a:uFill>
                   <a:solidFill>
-                    <a:srgbClr val="ffffff"/>
+                    <a:srgbClr val="FFFFFF"/>
                   </a:solidFill>
                 </a:uFill>
                 <a:latin typeface="Arial"/>
               </a:rPr>
               <a:t>Click to edit the outline text format</a:t>
             </a:r>
-            <a:endParaRPr lang="en-CA" sz="1800" spc="-1" strike="noStrike">
-              <a:solidFill>
-                <a:srgbClr val="000000"/>
-              </a:solidFill>
-              <a:uFill>
-                <a:solidFill>
-                  <a:srgbClr val="ffffff"/>
-                </a:solidFill>
-              </a:uFill>
-              <a:latin typeface="Arial"/>
-            </a:endParaRPr>
-          </a:p>
-          <a:p>
-            <a:pPr lvl="1" marL="864000" indent="-324000">
+          </a:p>
+          <a:p>
+            <a:pPr marL="864000" lvl="1" indent="-324000">
               <a:buClr>
                 <a:srgbClr val="000000"/>
               </a:buClr>
@@ -1648,33 +1809,22 @@
               <a:buChar char=""/>
             </a:pPr>
             <a:r>
-              <a:rPr lang="en-CA" sz="1800" spc="-1" strike="noStrike">
+              <a:rPr lang="en-CA" sz="1800" strike="noStrike" spc="-1">
                 <a:solidFill>
                   <a:srgbClr val="000000"/>
                 </a:solidFill>
                 <a:uFill>
                   <a:solidFill>
-                    <a:srgbClr val="ffffff"/>
+                    <a:srgbClr val="FFFFFF"/>
                   </a:solidFill>
                 </a:uFill>
                 <a:latin typeface="Arial"/>
               </a:rPr>
               <a:t>Second Outline Level</a:t>
             </a:r>
-            <a:endParaRPr lang="en-CA" sz="1800" spc="-1" strike="noStrike">
-              <a:solidFill>
-                <a:srgbClr val="000000"/>
-              </a:solidFill>
-              <a:uFill>
-                <a:solidFill>
-                  <a:srgbClr val="ffffff"/>
-                </a:solidFill>
-              </a:uFill>
-              <a:latin typeface="Arial"/>
-            </a:endParaRPr>
-          </a:p>
-          <a:p>
-            <a:pPr lvl="2" marL="1296000" indent="-288000">
+          </a:p>
+          <a:p>
+            <a:pPr marL="1296000" lvl="2" indent="-288000">
               <a:buClr>
                 <a:srgbClr val="000000"/>
               </a:buClr>
@@ -1683,33 +1833,22 @@
               <a:buChar char=""/>
             </a:pPr>
             <a:r>
-              <a:rPr lang="en-CA" sz="1800" spc="-1" strike="noStrike">
+              <a:rPr lang="en-CA" sz="1800" strike="noStrike" spc="-1">
                 <a:solidFill>
                   <a:srgbClr val="000000"/>
                 </a:solidFill>
                 <a:uFill>
                   <a:solidFill>
-                    <a:srgbClr val="ffffff"/>
+                    <a:srgbClr val="FFFFFF"/>
                   </a:solidFill>
                 </a:uFill>
                 <a:latin typeface="Arial"/>
               </a:rPr>
               <a:t>Third Outline Level</a:t>
             </a:r>
-            <a:endParaRPr lang="en-CA" sz="1800" spc="-1" strike="noStrike">
-              <a:solidFill>
-                <a:srgbClr val="000000"/>
-              </a:solidFill>
-              <a:uFill>
-                <a:solidFill>
-                  <a:srgbClr val="ffffff"/>
-                </a:solidFill>
-              </a:uFill>
-              <a:latin typeface="Arial"/>
-            </a:endParaRPr>
-          </a:p>
-          <a:p>
-            <a:pPr lvl="3" marL="1728000" indent="-216000">
+          </a:p>
+          <a:p>
+            <a:pPr marL="1728000" lvl="3" indent="-216000">
               <a:buClr>
                 <a:srgbClr val="000000"/>
               </a:buClr>
@@ -1718,33 +1857,22 @@
               <a:buChar char=""/>
             </a:pPr>
             <a:r>
-              <a:rPr lang="en-CA" sz="1800" spc="-1" strike="noStrike">
+              <a:rPr lang="en-CA" sz="1800" strike="noStrike" spc="-1">
                 <a:solidFill>
                   <a:srgbClr val="000000"/>
                 </a:solidFill>
                 <a:uFill>
                   <a:solidFill>
-                    <a:srgbClr val="ffffff"/>
+                    <a:srgbClr val="FFFFFF"/>
                   </a:solidFill>
                 </a:uFill>
                 <a:latin typeface="Arial"/>
               </a:rPr>
               <a:t>Fourth Outline Level</a:t>
             </a:r>
-            <a:endParaRPr lang="en-CA" sz="1800" spc="-1" strike="noStrike">
-              <a:solidFill>
-                <a:srgbClr val="000000"/>
-              </a:solidFill>
-              <a:uFill>
-                <a:solidFill>
-                  <a:srgbClr val="ffffff"/>
-                </a:solidFill>
-              </a:uFill>
-              <a:latin typeface="Arial"/>
-            </a:endParaRPr>
-          </a:p>
-          <a:p>
-            <a:pPr lvl="4" marL="2160000" indent="-216000">
+          </a:p>
+          <a:p>
+            <a:pPr marL="2160000" lvl="4" indent="-216000">
               <a:buClr>
                 <a:srgbClr val="000000"/>
               </a:buClr>
@@ -1753,33 +1881,22 @@
               <a:buChar char=""/>
             </a:pPr>
             <a:r>
-              <a:rPr lang="en-CA" sz="1800" spc="-1" strike="noStrike">
+              <a:rPr lang="en-CA" sz="1800" strike="noStrike" spc="-1">
                 <a:solidFill>
                   <a:srgbClr val="000000"/>
                 </a:solidFill>
                 <a:uFill>
                   <a:solidFill>
-                    <a:srgbClr val="ffffff"/>
+                    <a:srgbClr val="FFFFFF"/>
                   </a:solidFill>
                 </a:uFill>
                 <a:latin typeface="Arial"/>
               </a:rPr>
               <a:t>Fifth Outline Level</a:t>
             </a:r>
-            <a:endParaRPr lang="en-CA" sz="1800" spc="-1" strike="noStrike">
-              <a:solidFill>
-                <a:srgbClr val="000000"/>
-              </a:solidFill>
-              <a:uFill>
-                <a:solidFill>
-                  <a:srgbClr val="ffffff"/>
-                </a:solidFill>
-              </a:uFill>
-              <a:latin typeface="Arial"/>
-            </a:endParaRPr>
-          </a:p>
-          <a:p>
-            <a:pPr lvl="5" marL="2592000" indent="-216000">
+          </a:p>
+          <a:p>
+            <a:pPr marL="2592000" lvl="5" indent="-216000">
               <a:buClr>
                 <a:srgbClr val="000000"/>
               </a:buClr>
@@ -1788,33 +1905,22 @@
               <a:buChar char=""/>
             </a:pPr>
             <a:r>
-              <a:rPr lang="en-CA" sz="1800" spc="-1" strike="noStrike">
+              <a:rPr lang="en-CA" sz="1800" strike="noStrike" spc="-1">
                 <a:solidFill>
                   <a:srgbClr val="000000"/>
                 </a:solidFill>
                 <a:uFill>
                   <a:solidFill>
-                    <a:srgbClr val="ffffff"/>
+                    <a:srgbClr val="FFFFFF"/>
                   </a:solidFill>
                 </a:uFill>
                 <a:latin typeface="Arial"/>
               </a:rPr>
               <a:t>Sixth Outline Level</a:t>
             </a:r>
-            <a:endParaRPr lang="en-CA" sz="1800" spc="-1" strike="noStrike">
-              <a:solidFill>
-                <a:srgbClr val="000000"/>
-              </a:solidFill>
-              <a:uFill>
-                <a:solidFill>
-                  <a:srgbClr val="ffffff"/>
-                </a:solidFill>
-              </a:uFill>
-              <a:latin typeface="Arial"/>
-            </a:endParaRPr>
-          </a:p>
-          <a:p>
-            <a:pPr lvl="6" marL="3024000" indent="-216000">
+          </a:p>
+          <a:p>
+            <a:pPr marL="3024000" lvl="6" indent="-216000">
               <a:buClr>
                 <a:srgbClr val="000000"/>
               </a:buClr>
@@ -1823,30 +1929,19 @@
               <a:buChar char=""/>
             </a:pPr>
             <a:r>
-              <a:rPr lang="en-CA" sz="1800" spc="-1" strike="noStrike">
+              <a:rPr lang="en-CA" sz="1800" strike="noStrike" spc="-1">
                 <a:solidFill>
                   <a:srgbClr val="000000"/>
                 </a:solidFill>
                 <a:uFill>
                   <a:solidFill>
-                    <a:srgbClr val="ffffff"/>
+                    <a:srgbClr val="FFFFFF"/>
                   </a:solidFill>
                 </a:uFill>
                 <a:latin typeface="Arial"/>
               </a:rPr>
               <a:t>Seventh Outline Level</a:t>
             </a:r>
-            <a:endParaRPr lang="en-CA" sz="1800" spc="-1" strike="noStrike">
-              <a:solidFill>
-                <a:srgbClr val="000000"/>
-              </a:solidFill>
-              <a:uFill>
-                <a:solidFill>
-                  <a:srgbClr val="ffffff"/>
-                </a:solidFill>
-              </a:uFill>
-              <a:latin typeface="Arial"/>
-            </a:endParaRPr>
           </a:p>
         </p:txBody>
       </p:sp>
@@ -1870,170 +1965,328 @@
           </a:ln>
         </p:spPr>
         <p:txBody>
-          <a:bodyPr lIns="90000" rIns="90000" tIns="45000" bIns="45000"/>
+          <a:bodyPr lIns="90000" tIns="45000" rIns="90000" bIns="45000"/>
+          <a:lstStyle/>
           <a:p>
             <a:r>
-              <a:rPr lang="en-CA" sz="1800" spc="-1" strike="noStrike">
+              <a:rPr lang="en-CA" sz="1800" strike="noStrike" spc="-1">
                 <a:solidFill>
                   <a:srgbClr val="000000"/>
                 </a:solidFill>
                 <a:uFill>
                   <a:solidFill>
-                    <a:srgbClr val="ffffff"/>
+                    <a:srgbClr val="FFFFFF"/>
                   </a:solidFill>
                 </a:uFill>
                 <a:latin typeface="Arial"/>
               </a:rPr>
-              <a:t>OEC 2016</a:t>
+              <a:t>OEC 2016				  University of Ottawa			</a:t>
             </a:r>
-            <a:r>
-              <a:rPr lang="en-CA" sz="1800" spc="-1" strike="noStrike">
-                <a:solidFill>
-                  <a:srgbClr val="000000"/>
-                </a:solidFill>
-                <a:uFill>
-                  <a:solidFill>
-                    <a:srgbClr val="ffffff"/>
-                  </a:solidFill>
-                </a:uFill>
-                <a:latin typeface="Arial"/>
-              </a:rPr>
-              <a:t>	</a:t>
-            </a:r>
-            <a:r>
-              <a:rPr lang="en-CA" sz="1800" spc="-1" strike="noStrike">
-                <a:solidFill>
-                  <a:srgbClr val="000000"/>
-                </a:solidFill>
-                <a:uFill>
-                  <a:solidFill>
-                    <a:srgbClr val="ffffff"/>
-                  </a:solidFill>
-                </a:uFill>
-                <a:latin typeface="Arial"/>
-              </a:rPr>
-              <a:t>	</a:t>
-            </a:r>
-            <a:r>
-              <a:rPr lang="en-CA" sz="1800" spc="-1" strike="noStrike">
-                <a:solidFill>
-                  <a:srgbClr val="000000"/>
-                </a:solidFill>
-                <a:uFill>
-                  <a:solidFill>
-                    <a:srgbClr val="ffffff"/>
-                  </a:solidFill>
-                </a:uFill>
-                <a:latin typeface="Arial"/>
-              </a:rPr>
-              <a:t>	</a:t>
-            </a:r>
-            <a:r>
-              <a:rPr lang="en-CA" sz="1800" spc="-1" strike="noStrike">
-                <a:solidFill>
-                  <a:srgbClr val="000000"/>
-                </a:solidFill>
-                <a:uFill>
-                  <a:solidFill>
-                    <a:srgbClr val="ffffff"/>
-                  </a:solidFill>
-                </a:uFill>
-                <a:latin typeface="Arial"/>
-              </a:rPr>
-              <a:t>	</a:t>
-            </a:r>
-            <a:r>
-              <a:rPr lang="en-CA" sz="1800" spc="-1" strike="noStrike">
-                <a:solidFill>
-                  <a:srgbClr val="000000"/>
-                </a:solidFill>
-                <a:uFill>
-                  <a:solidFill>
-                    <a:srgbClr val="ffffff"/>
-                  </a:solidFill>
-                </a:uFill>
-                <a:latin typeface="Arial"/>
-              </a:rPr>
-              <a:t>  University of Ottawa</a:t>
-            </a:r>
-            <a:r>
-              <a:rPr lang="en-CA" sz="1800" spc="-1" strike="noStrike">
-                <a:solidFill>
-                  <a:srgbClr val="000000"/>
-                </a:solidFill>
-                <a:uFill>
-                  <a:solidFill>
-                    <a:srgbClr val="ffffff"/>
-                  </a:solidFill>
-                </a:uFill>
-                <a:latin typeface="Arial"/>
-              </a:rPr>
-              <a:t>	</a:t>
-            </a:r>
-            <a:r>
-              <a:rPr lang="en-CA" sz="1800" spc="-1" strike="noStrike">
-                <a:solidFill>
-                  <a:srgbClr val="000000"/>
-                </a:solidFill>
-                <a:uFill>
-                  <a:solidFill>
-                    <a:srgbClr val="ffffff"/>
-                  </a:solidFill>
-                </a:uFill>
-                <a:latin typeface="Arial"/>
-              </a:rPr>
-              <a:t>	</a:t>
-            </a:r>
-            <a:r>
-              <a:rPr lang="en-CA" sz="1800" spc="-1" strike="noStrike">
-                <a:solidFill>
-                  <a:srgbClr val="000000"/>
-                </a:solidFill>
-                <a:uFill>
-                  <a:solidFill>
-                    <a:srgbClr val="ffffff"/>
-                  </a:solidFill>
-                </a:uFill>
-                <a:latin typeface="Arial"/>
-              </a:rPr>
-              <a:t>	</a:t>
-            </a:r>
-            <a:endParaRPr lang="en-CA" sz="1800" spc="-1" strike="noStrike">
-              <a:solidFill>
-                <a:srgbClr val="000000"/>
-              </a:solidFill>
-              <a:uFill>
-                <a:solidFill>
-                  <a:srgbClr val="ffffff"/>
-                </a:solidFill>
-              </a:uFill>
-              <a:latin typeface="Arial"/>
-            </a:endParaRPr>
           </a:p>
         </p:txBody>
       </p:sp>
     </p:spTree>
   </p:cSld>
-  <p:clrMap bg1="lt1" bg2="lt2" tx1="dk1" tx2="dk2" accent1="accent1" accent2="accent2" accent3="accent3" accent4="accent4" accent5="accent5" accent6="accent6" hlink="hlink" folHlink="folHlink"/>
+  <p:clrMap bg1="lt1" tx1="dk1" bg2="lt2" tx2="dk2" accent1="accent1" accent2="accent2" accent3="accent3" accent4="accent4" accent5="accent5" accent6="accent6" hlink="hlink" folHlink="folHlink"/>
   <p:sldLayoutIdLst>
-    <p:sldLayoutId id="2147483649" r:id="rId2"/>
-    <p:sldLayoutId id="2147483650" r:id="rId3"/>
-    <p:sldLayoutId id="2147483651" r:id="rId4"/>
-    <p:sldLayoutId id="2147483652" r:id="rId5"/>
-    <p:sldLayoutId id="2147483653" r:id="rId6"/>
-    <p:sldLayoutId id="2147483654" r:id="rId7"/>
-    <p:sldLayoutId id="2147483655" r:id="rId8"/>
-    <p:sldLayoutId id="2147483656" r:id="rId9"/>
-    <p:sldLayoutId id="2147483657" r:id="rId10"/>
-    <p:sldLayoutId id="2147483658" r:id="rId11"/>
-    <p:sldLayoutId id="2147483659" r:id="rId12"/>
-    <p:sldLayoutId id="2147483660" r:id="rId13"/>
+    <p:sldLayoutId id="2147483649" r:id="rId1"/>
+    <p:sldLayoutId id="2147483650" r:id="rId2"/>
+    <p:sldLayoutId id="2147483651" r:id="rId3"/>
+    <p:sldLayoutId id="2147483652" r:id="rId4"/>
+    <p:sldLayoutId id="2147483653" r:id="rId5"/>
+    <p:sldLayoutId id="2147483654" r:id="rId6"/>
+    <p:sldLayoutId id="2147483655" r:id="rId7"/>
+    <p:sldLayoutId id="2147483656" r:id="rId8"/>
+    <p:sldLayoutId id="2147483657" r:id="rId9"/>
+    <p:sldLayoutId id="2147483658" r:id="rId10"/>
+    <p:sldLayoutId id="2147483659" r:id="rId11"/>
+    <p:sldLayoutId id="2147483660" r:id="rId12"/>
   </p:sldLayoutIdLst>
+  <p:txStyles>
+    <p:titleStyle>
+      <a:lvl1pPr algn="l" defTabSz="914400" rtl="0" eaLnBrk="1" latinLnBrk="0" hangingPunct="1">
+        <a:lnSpc>
+          <a:spcPct val="90000"/>
+        </a:lnSpc>
+        <a:spcBef>
+          <a:spcPct val="0"/>
+        </a:spcBef>
+        <a:buNone/>
+        <a:defRPr sz="4400" kern="1200">
+          <a:solidFill>
+            <a:schemeClr val="tx1"/>
+          </a:solidFill>
+          <a:latin typeface="+mj-lt"/>
+          <a:ea typeface="+mj-ea"/>
+          <a:cs typeface="+mj-cs"/>
+        </a:defRPr>
+      </a:lvl1pPr>
+    </p:titleStyle>
+    <p:bodyStyle>
+      <a:lvl1pPr marL="228600" indent="-228600" algn="l" defTabSz="914400" rtl="0" eaLnBrk="1" latinLnBrk="0" hangingPunct="1">
+        <a:lnSpc>
+          <a:spcPct val="90000"/>
+        </a:lnSpc>
+        <a:spcBef>
+          <a:spcPts val="1000"/>
+        </a:spcBef>
+        <a:buFont typeface="Arial" panose="020B0604020202020204" pitchFamily="34" charset="0"/>
+        <a:buChar char="•"/>
+        <a:defRPr sz="2800" kern="1200">
+          <a:solidFill>
+            <a:schemeClr val="tx1"/>
+          </a:solidFill>
+          <a:latin typeface="+mn-lt"/>
+          <a:ea typeface="+mn-ea"/>
+          <a:cs typeface="+mn-cs"/>
+        </a:defRPr>
+      </a:lvl1pPr>
+      <a:lvl2pPr marL="685800" indent="-228600" algn="l" defTabSz="914400" rtl="0" eaLnBrk="1" latinLnBrk="0" hangingPunct="1">
+        <a:lnSpc>
+          <a:spcPct val="90000"/>
+        </a:lnSpc>
+        <a:spcBef>
+          <a:spcPts val="500"/>
+        </a:spcBef>
+        <a:buFont typeface="Arial" panose="020B0604020202020204" pitchFamily="34" charset="0"/>
+        <a:buChar char="•"/>
+        <a:defRPr sz="2400" kern="1200">
+          <a:solidFill>
+            <a:schemeClr val="tx1"/>
+          </a:solidFill>
+          <a:latin typeface="+mn-lt"/>
+          <a:ea typeface="+mn-ea"/>
+          <a:cs typeface="+mn-cs"/>
+        </a:defRPr>
+      </a:lvl2pPr>
+      <a:lvl3pPr marL="1143000" indent="-228600" algn="l" defTabSz="914400" rtl="0" eaLnBrk="1" latinLnBrk="0" hangingPunct="1">
+        <a:lnSpc>
+          <a:spcPct val="90000"/>
+        </a:lnSpc>
+        <a:spcBef>
+          <a:spcPts val="500"/>
+        </a:spcBef>
+        <a:buFont typeface="Arial" panose="020B0604020202020204" pitchFamily="34" charset="0"/>
+        <a:buChar char="•"/>
+        <a:defRPr sz="2000" kern="1200">
+          <a:solidFill>
+            <a:schemeClr val="tx1"/>
+          </a:solidFill>
+          <a:latin typeface="+mn-lt"/>
+          <a:ea typeface="+mn-ea"/>
+          <a:cs typeface="+mn-cs"/>
+        </a:defRPr>
+      </a:lvl3pPr>
+      <a:lvl4pPr marL="1600200" indent="-228600" algn="l" defTabSz="914400" rtl="0" eaLnBrk="1" latinLnBrk="0" hangingPunct="1">
+        <a:lnSpc>
+          <a:spcPct val="90000"/>
+        </a:lnSpc>
+        <a:spcBef>
+          <a:spcPts val="500"/>
+        </a:spcBef>
+        <a:buFont typeface="Arial" panose="020B0604020202020204" pitchFamily="34" charset="0"/>
+        <a:buChar char="•"/>
+        <a:defRPr sz="1800" kern="1200">
+          <a:solidFill>
+            <a:schemeClr val="tx1"/>
+          </a:solidFill>
+          <a:latin typeface="+mn-lt"/>
+          <a:ea typeface="+mn-ea"/>
+          <a:cs typeface="+mn-cs"/>
+        </a:defRPr>
+      </a:lvl4pPr>
+      <a:lvl5pPr marL="2057400" indent="-228600" algn="l" defTabSz="914400" rtl="0" eaLnBrk="1" latinLnBrk="0" hangingPunct="1">
+        <a:lnSpc>
+          <a:spcPct val="90000"/>
+        </a:lnSpc>
+        <a:spcBef>
+          <a:spcPts val="500"/>
+        </a:spcBef>
+        <a:buFont typeface="Arial" panose="020B0604020202020204" pitchFamily="34" charset="0"/>
+        <a:buChar char="•"/>
+        <a:defRPr sz="1800" kern="1200">
+          <a:solidFill>
+            <a:schemeClr val="tx1"/>
+          </a:solidFill>
+          <a:latin typeface="+mn-lt"/>
+          <a:ea typeface="+mn-ea"/>
+          <a:cs typeface="+mn-cs"/>
+        </a:defRPr>
+      </a:lvl5pPr>
+      <a:lvl6pPr marL="2514600" indent="-228600" algn="l" defTabSz="914400" rtl="0" eaLnBrk="1" latinLnBrk="0" hangingPunct="1">
+        <a:lnSpc>
+          <a:spcPct val="90000"/>
+        </a:lnSpc>
+        <a:spcBef>
+          <a:spcPts val="500"/>
+        </a:spcBef>
+        <a:buFont typeface="Arial" panose="020B0604020202020204" pitchFamily="34" charset="0"/>
+        <a:buChar char="•"/>
+        <a:defRPr sz="1800" kern="1200">
+          <a:solidFill>
+            <a:schemeClr val="tx1"/>
+          </a:solidFill>
+          <a:latin typeface="+mn-lt"/>
+          <a:ea typeface="+mn-ea"/>
+          <a:cs typeface="+mn-cs"/>
+        </a:defRPr>
+      </a:lvl6pPr>
+      <a:lvl7pPr marL="2971800" indent="-228600" algn="l" defTabSz="914400" rtl="0" eaLnBrk="1" latinLnBrk="0" hangingPunct="1">
+        <a:lnSpc>
+          <a:spcPct val="90000"/>
+        </a:lnSpc>
+        <a:spcBef>
+          <a:spcPts val="500"/>
+        </a:spcBef>
+        <a:buFont typeface="Arial" panose="020B0604020202020204" pitchFamily="34" charset="0"/>
+        <a:buChar char="•"/>
+        <a:defRPr sz="1800" kern="1200">
+          <a:solidFill>
+            <a:schemeClr val="tx1"/>
+          </a:solidFill>
+          <a:latin typeface="+mn-lt"/>
+          <a:ea typeface="+mn-ea"/>
+          <a:cs typeface="+mn-cs"/>
+        </a:defRPr>
+      </a:lvl7pPr>
+      <a:lvl8pPr marL="3429000" indent="-228600" algn="l" defTabSz="914400" rtl="0" eaLnBrk="1" latinLnBrk="0" hangingPunct="1">
+        <a:lnSpc>
+          <a:spcPct val="90000"/>
+        </a:lnSpc>
+        <a:spcBef>
+          <a:spcPts val="500"/>
+        </a:spcBef>
+        <a:buFont typeface="Arial" panose="020B0604020202020204" pitchFamily="34" charset="0"/>
+        <a:buChar char="•"/>
+        <a:defRPr sz="1800" kern="1200">
+          <a:solidFill>
+            <a:schemeClr val="tx1"/>
+          </a:solidFill>
+          <a:latin typeface="+mn-lt"/>
+          <a:ea typeface="+mn-ea"/>
+          <a:cs typeface="+mn-cs"/>
+        </a:defRPr>
+      </a:lvl8pPr>
+      <a:lvl9pPr marL="3886200" indent="-228600" algn="l" defTabSz="914400" rtl="0" eaLnBrk="1" latinLnBrk="0" hangingPunct="1">
+        <a:lnSpc>
+          <a:spcPct val="90000"/>
+        </a:lnSpc>
+        <a:spcBef>
+          <a:spcPts val="500"/>
+        </a:spcBef>
+        <a:buFont typeface="Arial" panose="020B0604020202020204" pitchFamily="34" charset="0"/>
+        <a:buChar char="•"/>
+        <a:defRPr sz="1800" kern="1200">
+          <a:solidFill>
+            <a:schemeClr val="tx1"/>
+          </a:solidFill>
+          <a:latin typeface="+mn-lt"/>
+          <a:ea typeface="+mn-ea"/>
+          <a:cs typeface="+mn-cs"/>
+        </a:defRPr>
+      </a:lvl9pPr>
+    </p:bodyStyle>
+    <p:otherStyle>
+      <a:defPPr>
+        <a:defRPr lang="en-US"/>
+      </a:defPPr>
+      <a:lvl1pPr marL="0" algn="l" defTabSz="914400" rtl="0" eaLnBrk="1" latinLnBrk="0" hangingPunct="1">
+        <a:defRPr sz="1800" kern="1200">
+          <a:solidFill>
+            <a:schemeClr val="tx1"/>
+          </a:solidFill>
+          <a:latin typeface="+mn-lt"/>
+          <a:ea typeface="+mn-ea"/>
+          <a:cs typeface="+mn-cs"/>
+        </a:defRPr>
+      </a:lvl1pPr>
+      <a:lvl2pPr marL="457200" algn="l" defTabSz="914400" rtl="0" eaLnBrk="1" latinLnBrk="0" hangingPunct="1">
+        <a:defRPr sz="1800" kern="1200">
+          <a:solidFill>
+            <a:schemeClr val="tx1"/>
+          </a:solidFill>
+          <a:latin typeface="+mn-lt"/>
+          <a:ea typeface="+mn-ea"/>
+          <a:cs typeface="+mn-cs"/>
+        </a:defRPr>
+      </a:lvl2pPr>
+      <a:lvl3pPr marL="914400" algn="l" defTabSz="914400" rtl="0" eaLnBrk="1" latinLnBrk="0" hangingPunct="1">
+        <a:defRPr sz="1800" kern="1200">
+          <a:solidFill>
+            <a:schemeClr val="tx1"/>
+          </a:solidFill>
+          <a:latin typeface="+mn-lt"/>
+          <a:ea typeface="+mn-ea"/>
+          <a:cs typeface="+mn-cs"/>
+        </a:defRPr>
+      </a:lvl3pPr>
+      <a:lvl4pPr marL="1371600" algn="l" defTabSz="914400" rtl="0" eaLnBrk="1" latinLnBrk="0" hangingPunct="1">
+        <a:defRPr sz="1800" kern="1200">
+          <a:solidFill>
+            <a:schemeClr val="tx1"/>
+          </a:solidFill>
+          <a:latin typeface="+mn-lt"/>
+          <a:ea typeface="+mn-ea"/>
+          <a:cs typeface="+mn-cs"/>
+        </a:defRPr>
+      </a:lvl4pPr>
+      <a:lvl5pPr marL="1828800" algn="l" defTabSz="914400" rtl="0" eaLnBrk="1" latinLnBrk="0" hangingPunct="1">
+        <a:defRPr sz="1800" kern="1200">
+          <a:solidFill>
+            <a:schemeClr val="tx1"/>
+          </a:solidFill>
+          <a:latin typeface="+mn-lt"/>
+          <a:ea typeface="+mn-ea"/>
+          <a:cs typeface="+mn-cs"/>
+        </a:defRPr>
+      </a:lvl5pPr>
+      <a:lvl6pPr marL="2286000" algn="l" defTabSz="914400" rtl="0" eaLnBrk="1" latinLnBrk="0" hangingPunct="1">
+        <a:defRPr sz="1800" kern="1200">
+          <a:solidFill>
+            <a:schemeClr val="tx1"/>
+          </a:solidFill>
+          <a:latin typeface="+mn-lt"/>
+          <a:ea typeface="+mn-ea"/>
+          <a:cs typeface="+mn-cs"/>
+        </a:defRPr>
+      </a:lvl6pPr>
+      <a:lvl7pPr marL="2743200" algn="l" defTabSz="914400" rtl="0" eaLnBrk="1" latinLnBrk="0" hangingPunct="1">
+        <a:defRPr sz="1800" kern="1200">
+          <a:solidFill>
+            <a:schemeClr val="tx1"/>
+          </a:solidFill>
+          <a:latin typeface="+mn-lt"/>
+          <a:ea typeface="+mn-ea"/>
+          <a:cs typeface="+mn-cs"/>
+        </a:defRPr>
+      </a:lvl7pPr>
+      <a:lvl8pPr marL="3200400" algn="l" defTabSz="914400" rtl="0" eaLnBrk="1" latinLnBrk="0" hangingPunct="1">
+        <a:defRPr sz="1800" kern="1200">
+          <a:solidFill>
+            <a:schemeClr val="tx1"/>
+          </a:solidFill>
+          <a:latin typeface="+mn-lt"/>
+          <a:ea typeface="+mn-ea"/>
+          <a:cs typeface="+mn-cs"/>
+        </a:defRPr>
+      </a:lvl8pPr>
+      <a:lvl9pPr marL="3657600" algn="l" defTabSz="914400" rtl="0" eaLnBrk="1" latinLnBrk="0" hangingPunct="1">
+        <a:defRPr sz="1800" kern="1200">
+          <a:solidFill>
+            <a:schemeClr val="tx1"/>
+          </a:solidFill>
+          <a:latin typeface="+mn-lt"/>
+          <a:ea typeface="+mn-ea"/>
+          <a:cs typeface="+mn-cs"/>
+        </a:defRPr>
+      </a:lvl9pPr>
+    </p:otherStyle>
+  </p:txStyles>
 </p:sldMaster>
 </file>
 
 <file path=ppt/slides/slide1.xml><?xml version="1.0" encoding="utf-8"?>
-<p:sld xmlns:a="http://schemas.openxmlformats.org/drawingml/2006/main" xmlns:p="http://schemas.openxmlformats.org/presentationml/2006/main" xmlns:r="http://schemas.openxmlformats.org/officeDocument/2006/relationships">
+<p:sld xmlns:a="http://schemas.openxmlformats.org/drawingml/2006/main" xmlns:r="http://schemas.openxmlformats.org/officeDocument/2006/relationships" xmlns:p="http://schemas.openxmlformats.org/presentationml/2006/main">
   <p:cSld>
     <p:spTree>
       <p:nvGrpSpPr>
@@ -2069,13 +2322,20 @@
           </a:ln>
         </p:spPr>
         <p:style>
-          <a:lnRef idx="0"/>
-          <a:fillRef idx="0"/>
-          <a:effectRef idx="0"/>
+          <a:lnRef idx="0">
+            <a:scrgbClr r="0" g="0" b="0"/>
+          </a:lnRef>
+          <a:fillRef idx="0">
+            <a:scrgbClr r="0" g="0" b="0"/>
+          </a:fillRef>
+          <a:effectRef idx="0">
+            <a:scrgbClr r="0" g="0" b="0"/>
+          </a:effectRef>
           <a:fontRef idx="minor"/>
         </p:style>
         <p:txBody>
-          <a:bodyPr lIns="0" rIns="0" tIns="0" bIns="0" anchor="ctr"/>
+          <a:bodyPr lIns="0" tIns="0" rIns="0" bIns="0" anchor="ctr"/>
+          <a:lstStyle/>
           <a:p>
             <a:pPr algn="ctr">
               <a:lnSpc>
@@ -2083,26 +2343,26 @@
               </a:lnSpc>
             </a:pPr>
             <a:r>
-              <a:rPr lang="en-CA" sz="4400" spc="-1" strike="noStrike">
-                <a:solidFill>
-                  <a:srgbClr val="ffffff"/>
+              <a:rPr lang="en-CA" sz="4400" strike="noStrike" spc="-1">
+                <a:solidFill>
+                  <a:srgbClr val="FFFFFF"/>
                 </a:solidFill>
                 <a:uFill>
                   <a:solidFill>
-                    <a:srgbClr val="ffffff"/>
+                    <a:srgbClr val="FFFFFF"/>
                   </a:solidFill>
                 </a:uFill>
                 <a:latin typeface="Arial"/>
               </a:rPr>
               <a:t>&lt;NAME OF PROGRAM&gt;</a:t>
             </a:r>
-            <a:endParaRPr lang="en-CA" sz="1800" spc="-1" strike="noStrike">
-              <a:solidFill>
-                <a:srgbClr val="000000"/>
-              </a:solidFill>
-              <a:uFill>
-                <a:solidFill>
-                  <a:srgbClr val="ffffff"/>
+            <a:endParaRPr lang="en-CA" sz="1800" strike="noStrike" spc="-1">
+              <a:solidFill>
+                <a:srgbClr val="000000"/>
+              </a:solidFill>
+              <a:uFill>
+                <a:solidFill>
+                  <a:srgbClr val="FFFFFF"/>
                 </a:solidFill>
               </a:uFill>
               <a:latin typeface="Arial"/>
@@ -2130,13 +2390,20 @@
           </a:ln>
         </p:spPr>
         <p:style>
-          <a:lnRef idx="0"/>
-          <a:fillRef idx="0"/>
-          <a:effectRef idx="0"/>
+          <a:lnRef idx="0">
+            <a:scrgbClr r="0" g="0" b="0"/>
+          </a:lnRef>
+          <a:fillRef idx="0">
+            <a:scrgbClr r="0" g="0" b="0"/>
+          </a:fillRef>
+          <a:effectRef idx="0">
+            <a:scrgbClr r="0" g="0" b="0"/>
+          </a:effectRef>
           <a:fontRef idx="minor"/>
         </p:style>
         <p:txBody>
-          <a:bodyPr lIns="0" rIns="0" tIns="0" bIns="0"/>
+          <a:bodyPr lIns="0" tIns="0" rIns="0" bIns="0"/>
+          <a:lstStyle/>
           <a:p>
             <a:pPr marL="432000" indent="-323640">
               <a:lnSpc>
@@ -2150,26 +2417,26 @@
               <a:buChar char=""/>
             </a:pPr>
             <a:r>
-              <a:rPr lang="en-CA" sz="3200" spc="-1" strike="noStrike">
+              <a:rPr lang="en-CA" sz="3200" strike="noStrike" spc="-1">
                 <a:solidFill>
                   <a:srgbClr val="000000"/>
                 </a:solidFill>
                 <a:uFill>
                   <a:solidFill>
-                    <a:srgbClr val="ffffff"/>
+                    <a:srgbClr val="FFFFFF"/>
                   </a:solidFill>
                 </a:uFill>
                 <a:latin typeface="Arial"/>
               </a:rPr>
               <a:t>&lt;One line Description&gt;</a:t>
             </a:r>
-            <a:endParaRPr lang="en-CA" sz="1800" spc="-1" strike="noStrike">
-              <a:solidFill>
-                <a:srgbClr val="000000"/>
-              </a:solidFill>
-              <a:uFill>
-                <a:solidFill>
-                  <a:srgbClr val="ffffff"/>
+            <a:endParaRPr lang="en-CA" sz="1800" strike="noStrike" spc="-1">
+              <a:solidFill>
+                <a:srgbClr val="000000"/>
+              </a:solidFill>
+              <a:uFill>
+                <a:solidFill>
+                  <a:srgbClr val="FFFFFF"/>
                 </a:solidFill>
               </a:uFill>
               <a:latin typeface="Arial"/>
@@ -2188,26 +2455,26 @@
               <a:buChar char=""/>
             </a:pPr>
             <a:r>
-              <a:rPr lang="en-CA" sz="3200" spc="-1" strike="noStrike">
+              <a:rPr lang="en-CA" sz="3200" strike="noStrike" spc="-1">
                 <a:solidFill>
                   <a:srgbClr val="000000"/>
                 </a:solidFill>
                 <a:uFill>
                   <a:solidFill>
-                    <a:srgbClr val="ffffff"/>
+                    <a:srgbClr val="FFFFFF"/>
                   </a:solidFill>
                 </a:uFill>
                 <a:latin typeface="Arial"/>
               </a:rPr>
               <a:t> </a:t>
             </a:r>
-            <a:endParaRPr lang="en-CA" sz="1800" spc="-1" strike="noStrike">
-              <a:solidFill>
-                <a:srgbClr val="000000"/>
-              </a:solidFill>
-              <a:uFill>
-                <a:solidFill>
-                  <a:srgbClr val="ffffff"/>
+            <a:endParaRPr lang="en-CA" sz="1800" strike="noStrike" spc="-1">
+              <a:solidFill>
+                <a:srgbClr val="000000"/>
+              </a:solidFill>
+              <a:uFill>
+                <a:solidFill>
+                  <a:srgbClr val="FFFFFF"/>
                 </a:solidFill>
               </a:uFill>
               <a:latin typeface="Arial"/>
@@ -2235,35 +2502,42 @@
           </a:ln>
         </p:spPr>
         <p:style>
-          <a:lnRef idx="0"/>
-          <a:fillRef idx="0"/>
-          <a:effectRef idx="0"/>
+          <a:lnRef idx="0">
+            <a:scrgbClr r="0" g="0" b="0"/>
+          </a:lnRef>
+          <a:fillRef idx="0">
+            <a:scrgbClr r="0" g="0" b="0"/>
+          </a:fillRef>
+          <a:effectRef idx="0">
+            <a:scrgbClr r="0" g="0" b="0"/>
+          </a:effectRef>
           <a:fontRef idx="minor"/>
         </p:style>
         <p:txBody>
-          <a:bodyPr lIns="90000" rIns="90000" tIns="45000" bIns="45000"/>
+          <a:bodyPr lIns="90000" tIns="45000" rIns="90000" bIns="45000"/>
+          <a:lstStyle/>
           <a:p>
             <a:r>
-              <a:rPr lang="en-CA" sz="1800" spc="-1" strike="noStrike" u="sng">
+              <a:rPr lang="en-CA" sz="1800" u="sng" strike="noStrike" spc="-1" dirty="0">
                 <a:solidFill>
                   <a:srgbClr val="000000"/>
                 </a:solidFill>
                 <a:uFill>
                   <a:solidFill>
-                    <a:srgbClr val="ffffff"/>
+                    <a:srgbClr val="FFFFFF"/>
                   </a:solidFill>
                 </a:uFill>
                 <a:latin typeface="Arial"/>
               </a:rPr>
               <a:t>Development Team:</a:t>
             </a:r>
-            <a:endParaRPr lang="en-CA" sz="1800" spc="-1" strike="noStrike">
-              <a:solidFill>
-                <a:srgbClr val="000000"/>
-              </a:solidFill>
-              <a:uFill>
-                <a:solidFill>
-                  <a:srgbClr val="ffffff"/>
+            <a:endParaRPr lang="en-CA" sz="1800" strike="noStrike" spc="-1" dirty="0">
+              <a:solidFill>
+                <a:srgbClr val="000000"/>
+              </a:solidFill>
+              <a:uFill>
+                <a:solidFill>
+                  <a:srgbClr val="FFFFFF"/>
                 </a:solidFill>
               </a:uFill>
               <a:latin typeface="Arial"/>
@@ -2271,13 +2545,13 @@
           </a:p>
           <a:p>
             <a:r>
-              <a:rPr lang="en-CA" sz="1800" spc="-1" strike="noStrike">
+              <a:rPr lang="en-CA" sz="1800" strike="noStrike" spc="-1" dirty="0">
                 <a:solidFill>
                   <a:srgbClr val="000000"/>
                 </a:solidFill>
                 <a:uFill>
                   <a:solidFill>
-                    <a:srgbClr val="ffffff"/>
+                    <a:srgbClr val="FFFFFF"/>
                   </a:solidFill>
                 </a:uFill>
                 <a:latin typeface="Arial"/>
@@ -2285,26 +2559,26 @@
               <a:t>	</a:t>
             </a:r>
             <a:r>
-              <a:rPr lang="en-CA" sz="1800" spc="-1" strike="noStrike">
+              <a:rPr lang="en-CA" sz="1800" strike="noStrike" spc="-1" dirty="0" smtClean="0">
                 <a:solidFill>
                   <a:srgbClr val="000000"/>
                 </a:solidFill>
                 <a:uFill>
                   <a:solidFill>
-                    <a:srgbClr val="ffffff"/>
+                    <a:srgbClr val="FFFFFF"/>
                   </a:solidFill>
                 </a:uFill>
                 <a:latin typeface="Arial"/>
               </a:rPr>
-              <a:t>Manit</a:t>
+              <a:t>Manit Ginoya</a:t>
             </a:r>
-            <a:endParaRPr lang="en-CA" sz="1800" spc="-1" strike="noStrike">
-              <a:solidFill>
-                <a:srgbClr val="000000"/>
-              </a:solidFill>
-              <a:uFill>
-                <a:solidFill>
-                  <a:srgbClr val="ffffff"/>
+            <a:endParaRPr lang="en-CA" sz="1800" strike="noStrike" spc="-1" dirty="0">
+              <a:solidFill>
+                <a:srgbClr val="000000"/>
+              </a:solidFill>
+              <a:uFill>
+                <a:solidFill>
+                  <a:srgbClr val="FFFFFF"/>
                 </a:solidFill>
               </a:uFill>
               <a:latin typeface="Arial"/>
@@ -2312,13 +2586,13 @@
           </a:p>
           <a:p>
             <a:r>
-              <a:rPr lang="en-CA" sz="1800" spc="-1" strike="noStrike">
+              <a:rPr lang="en-CA" sz="1800" strike="noStrike" spc="-1" dirty="0">
                 <a:solidFill>
                   <a:srgbClr val="000000"/>
                 </a:solidFill>
                 <a:uFill>
                   <a:solidFill>
-                    <a:srgbClr val="ffffff"/>
+                    <a:srgbClr val="FFFFFF"/>
                   </a:solidFill>
                 </a:uFill>
                 <a:latin typeface="Arial"/>
@@ -2326,67 +2600,95 @@
               <a:t>	</a:t>
             </a:r>
             <a:r>
-              <a:rPr lang="en-CA" sz="1800" spc="-1" strike="noStrike">
+              <a:rPr lang="en-CA" sz="1800" strike="noStrike" spc="-1" dirty="0" err="1">
                 <a:solidFill>
                   <a:srgbClr val="000000"/>
                 </a:solidFill>
                 <a:uFill>
                   <a:solidFill>
-                    <a:srgbClr val="ffffff"/>
+                    <a:srgbClr val="FFFFFF"/>
                   </a:solidFill>
                 </a:uFill>
                 <a:latin typeface="Arial"/>
               </a:rPr>
-              <a:t>Rushil Perera</a:t>
+              <a:t>Rushil</a:t>
             </a:r>
-            <a:endParaRPr lang="en-CA" sz="1800" spc="-1" strike="noStrike">
-              <a:solidFill>
-                <a:srgbClr val="000000"/>
-              </a:solidFill>
-              <a:uFill>
-                <a:solidFill>
-                  <a:srgbClr val="ffffff"/>
-                </a:solidFill>
-              </a:uFill>
-              <a:latin typeface="Arial"/>
-            </a:endParaRPr>
-          </a:p>
-          <a:p>
             <a:r>
-              <a:rPr lang="en-CA" sz="1800" spc="-1" strike="noStrike">
+              <a:rPr lang="en-CA" sz="1800" strike="noStrike" spc="-1" dirty="0">
                 <a:solidFill>
                   <a:srgbClr val="000000"/>
                 </a:solidFill>
                 <a:uFill>
                   <a:solidFill>
-                    <a:srgbClr val="ffffff"/>
+                    <a:srgbClr val="FFFFFF"/>
                   </a:solidFill>
                 </a:uFill>
                 <a:latin typeface="Arial"/>
               </a:rPr>
-              <a:t>	</a:t>
+              <a:t> </a:t>
             </a:r>
             <a:r>
-              <a:rPr lang="en-CA" sz="1800" spc="-1" strike="noStrike">
+              <a:rPr lang="en-CA" sz="1800" strike="noStrike" spc="-1" dirty="0" err="1">
                 <a:solidFill>
                   <a:srgbClr val="000000"/>
                 </a:solidFill>
                 <a:uFill>
                   <a:solidFill>
-                    <a:srgbClr val="ffffff"/>
+                    <a:srgbClr val="FFFFFF"/>
                   </a:solidFill>
                 </a:uFill>
                 <a:latin typeface="Arial"/>
               </a:rPr>
-              <a:t>Nikhil Peri</a:t>
+              <a:t>Perera</a:t>
             </a:r>
-            <a:endParaRPr lang="en-CA" sz="1800" spc="-1" strike="noStrike">
-              <a:solidFill>
-                <a:srgbClr val="000000"/>
-              </a:solidFill>
-              <a:uFill>
-                <a:solidFill>
-                  <a:srgbClr val="ffffff"/>
+            <a:endParaRPr lang="en-CA" sz="1800" strike="noStrike" spc="-1" dirty="0">
+              <a:solidFill>
+                <a:srgbClr val="000000"/>
+              </a:solidFill>
+              <a:uFill>
+                <a:solidFill>
+                  <a:srgbClr val="FFFFFF"/>
+                </a:solidFill>
+              </a:uFill>
+              <a:latin typeface="Arial"/>
+            </a:endParaRPr>
+          </a:p>
+          <a:p>
+            <a:r>
+              <a:rPr lang="en-CA" sz="1800" strike="noStrike" spc="-1" dirty="0">
+                <a:solidFill>
+                  <a:srgbClr val="000000"/>
+                </a:solidFill>
+                <a:uFill>
+                  <a:solidFill>
+                    <a:srgbClr val="FFFFFF"/>
+                  </a:solidFill>
+                </a:uFill>
+                <a:latin typeface="Arial"/>
+              </a:rPr>
+              <a:t>	Nikhil </a:t>
+            </a:r>
+            <a:r>
+              <a:rPr lang="en-CA" sz="1800" strike="noStrike" spc="-1" dirty="0" err="1">
+                <a:solidFill>
+                  <a:srgbClr val="000000"/>
+                </a:solidFill>
+                <a:uFill>
+                  <a:solidFill>
+                    <a:srgbClr val="FFFFFF"/>
+                  </a:solidFill>
+                </a:uFill>
+                <a:latin typeface="Arial"/>
+              </a:rPr>
+              <a:t>Peri</a:t>
+            </a:r>
+            <a:endParaRPr lang="en-CA" sz="1800" strike="noStrike" spc="-1" dirty="0">
+              <a:solidFill>
+                <a:srgbClr val="000000"/>
+              </a:solidFill>
+              <a:uFill>
+                <a:solidFill>
+                  <a:srgbClr val="FFFFFF"/>
                 </a:solidFill>
               </a:uFill>
               <a:latin typeface="Arial"/>
@@ -2396,6 +2698,9 @@
       </p:sp>
     </p:spTree>
   </p:cSld>
+  <p:clrMapOvr>
+    <a:masterClrMapping/>
+  </p:clrMapOvr>
   <p:transition>
     <p:push dir="r"/>
   </p:transition>
@@ -2407,14 +2712,14 @@
             <p:seq>
               <p:cTn id="2" nodeType="mainSeq"/>
               <p:prevCondLst>
-                <p:cond delay="0" evt="onPrev">
+                <p:cond evt="onPrev" delay="0">
                   <p:tgtEl>
                     <p:sldTgt/>
                   </p:tgtEl>
                 </p:cond>
               </p:prevCondLst>
               <p:nextCondLst>
-                <p:cond delay="0" evt="onNext">
+                <p:cond evt="onNext" delay="0">
                   <p:tgtEl>
                     <p:sldTgt/>
                   </p:tgtEl>
@@ -2430,7 +2735,7 @@
 </file>
 
 <file path=ppt/slides/slide2.xml><?xml version="1.0" encoding="utf-8"?>
-<p:sld xmlns:a="http://schemas.openxmlformats.org/drawingml/2006/main" xmlns:p="http://schemas.openxmlformats.org/presentationml/2006/main" xmlns:r="http://schemas.openxmlformats.org/officeDocument/2006/relationships">
+<p:sld xmlns:a="http://schemas.openxmlformats.org/drawingml/2006/main" xmlns:r="http://schemas.openxmlformats.org/officeDocument/2006/relationships" xmlns:p="http://schemas.openxmlformats.org/presentationml/2006/main">
   <p:cSld>
     <p:spTree>
       <p:nvGrpSpPr>
@@ -2466,13 +2771,20 @@
           </a:ln>
         </p:spPr>
         <p:style>
-          <a:lnRef idx="0"/>
-          <a:fillRef idx="0"/>
-          <a:effectRef idx="0"/>
+          <a:lnRef idx="0">
+            <a:scrgbClr r="0" g="0" b="0"/>
+          </a:lnRef>
+          <a:fillRef idx="0">
+            <a:scrgbClr r="0" g="0" b="0"/>
+          </a:fillRef>
+          <a:effectRef idx="0">
+            <a:scrgbClr r="0" g="0" b="0"/>
+          </a:effectRef>
           <a:fontRef idx="minor"/>
         </p:style>
         <p:txBody>
-          <a:bodyPr lIns="0" rIns="0" tIns="0" bIns="0" anchor="ctr"/>
+          <a:bodyPr lIns="0" tIns="0" rIns="0" bIns="0" anchor="ctr"/>
+          <a:lstStyle/>
           <a:p>
             <a:pPr algn="ctr">
               <a:lnSpc>
@@ -2480,26 +2792,26 @@
               </a:lnSpc>
             </a:pPr>
             <a:r>
-              <a:rPr lang="en-CA" sz="4400" spc="-1" strike="noStrike">
-                <a:solidFill>
-                  <a:srgbClr val="ffffff"/>
+              <a:rPr lang="en-CA" sz="4400" strike="noStrike" spc="-1">
+                <a:solidFill>
+                  <a:srgbClr val="FFFFFF"/>
                 </a:solidFill>
                 <a:uFill>
                   <a:solidFill>
-                    <a:srgbClr val="ffffff"/>
+                    <a:srgbClr val="FFFFFF"/>
                   </a:solidFill>
                 </a:uFill>
                 <a:latin typeface="Arial"/>
               </a:rPr>
               <a:t>Development Tools</a:t>
             </a:r>
-            <a:endParaRPr lang="en-CA" sz="1800" spc="-1" strike="noStrike">
-              <a:solidFill>
-                <a:srgbClr val="000000"/>
-              </a:solidFill>
-              <a:uFill>
-                <a:solidFill>
-                  <a:srgbClr val="ffffff"/>
+            <a:endParaRPr lang="en-CA" sz="1800" strike="noStrike" spc="-1">
+              <a:solidFill>
+                <a:srgbClr val="000000"/>
+              </a:solidFill>
+              <a:uFill>
+                <a:solidFill>
+                  <a:srgbClr val="FFFFFF"/>
                 </a:solidFill>
               </a:uFill>
               <a:latin typeface="Arial"/>
@@ -2527,13 +2839,20 @@
           </a:ln>
         </p:spPr>
         <p:style>
-          <a:lnRef idx="0"/>
-          <a:fillRef idx="0"/>
-          <a:effectRef idx="0"/>
+          <a:lnRef idx="0">
+            <a:scrgbClr r="0" g="0" b="0"/>
+          </a:lnRef>
+          <a:fillRef idx="0">
+            <a:scrgbClr r="0" g="0" b="0"/>
+          </a:fillRef>
+          <a:effectRef idx="0">
+            <a:scrgbClr r="0" g="0" b="0"/>
+          </a:effectRef>
           <a:fontRef idx="minor"/>
         </p:style>
         <p:txBody>
-          <a:bodyPr lIns="0" rIns="0" tIns="0" bIns="0"/>
+          <a:bodyPr lIns="0" tIns="0" rIns="0" bIns="0"/>
+          <a:lstStyle/>
           <a:p>
             <a:pPr marL="432000" indent="-323640">
               <a:lnSpc>
@@ -2547,26 +2866,26 @@
               <a:buChar char=""/>
             </a:pPr>
             <a:r>
-              <a:rPr lang="en-CA" sz="3200" spc="-1" strike="noStrike">
+              <a:rPr lang="en-CA" sz="3200" strike="noStrike" spc="-1">
                 <a:solidFill>
                   <a:srgbClr val="000000"/>
                 </a:solidFill>
                 <a:uFill>
                   <a:solidFill>
-                    <a:srgbClr val="ffffff"/>
+                    <a:srgbClr val="FFFFFF"/>
                   </a:solidFill>
                 </a:uFill>
                 <a:latin typeface="Arial"/>
               </a:rPr>
               <a:t>This application was developed using the Processing Framework for Java</a:t>
             </a:r>
-            <a:endParaRPr lang="en-CA" sz="1800" spc="-1" strike="noStrike">
-              <a:solidFill>
-                <a:srgbClr val="000000"/>
-              </a:solidFill>
-              <a:uFill>
-                <a:solidFill>
-                  <a:srgbClr val="ffffff"/>
+            <a:endParaRPr lang="en-CA" sz="1800" strike="noStrike" spc="-1">
+              <a:solidFill>
+                <a:srgbClr val="000000"/>
+              </a:solidFill>
+              <a:uFill>
+                <a:solidFill>
+                  <a:srgbClr val="FFFFFF"/>
                 </a:solidFill>
               </a:uFill>
               <a:latin typeface="Arial"/>
@@ -2585,26 +2904,26 @@
               <a:buChar char=""/>
             </a:pPr>
             <a:r>
-              <a:rPr lang="en-CA" sz="3200" spc="-1" strike="noStrike">
+              <a:rPr lang="en-CA" sz="3200" strike="noStrike" spc="-1">
                 <a:solidFill>
                   <a:srgbClr val="000000"/>
                 </a:solidFill>
                 <a:uFill>
                   <a:solidFill>
-                    <a:srgbClr val="ffffff"/>
+                    <a:srgbClr val="FFFFFF"/>
                   </a:solidFill>
                 </a:uFill>
                 <a:latin typeface="Arial"/>
               </a:rPr>
               <a:t>Allowing for easy development of graphical applications</a:t>
             </a:r>
-            <a:endParaRPr lang="en-CA" sz="1800" spc="-1" strike="noStrike">
-              <a:solidFill>
-                <a:srgbClr val="000000"/>
-              </a:solidFill>
-              <a:uFill>
-                <a:solidFill>
-                  <a:srgbClr val="ffffff"/>
+            <a:endParaRPr lang="en-CA" sz="1800" strike="noStrike" spc="-1">
+              <a:solidFill>
+                <a:srgbClr val="000000"/>
+              </a:solidFill>
+              <a:uFill>
+                <a:solidFill>
+                  <a:srgbClr val="FFFFFF"/>
                 </a:solidFill>
               </a:uFill>
               <a:latin typeface="Arial"/>
@@ -2614,12 +2933,12 @@
       </p:sp>
       <p:pic>
         <p:nvPicPr>
-          <p:cNvPr id="43" name="" descr=""/>
+          <p:cNvPr id="43" name="Picture 42"/>
           <p:cNvPicPr/>
           <p:nvPr/>
         </p:nvPicPr>
         <p:blipFill>
-          <a:blip r:embed="rId1">
+          <a:blip r:embed="rId2">
             <a:lum contrast="3000"/>
           </a:blip>
           <a:stretch/>
@@ -2639,25 +2958,28 @@
       </p:pic>
     </p:spTree>
   </p:cSld>
+  <p:clrMapOvr>
+    <a:masterClrMapping/>
+  </p:clrMapOvr>
   <p:transition>
     <p:push dir="r"/>
   </p:transition>
   <p:timing>
     <p:tnLst>
       <p:par>
-        <p:cTn id="3" dur="indefinite" restart="never" nodeType="tmRoot">
+        <p:cTn id="1" dur="indefinite" restart="never" nodeType="tmRoot">
           <p:childTnLst>
             <p:seq>
-              <p:cTn id="4" nodeType="mainSeq"/>
+              <p:cTn id="2" nodeType="mainSeq"/>
               <p:prevCondLst>
-                <p:cond delay="0" evt="onPrev">
+                <p:cond evt="onPrev" delay="0">
                   <p:tgtEl>
                     <p:sldTgt/>
                   </p:tgtEl>
                 </p:cond>
               </p:prevCondLst>
               <p:nextCondLst>
-                <p:cond delay="0" evt="onNext">
+                <p:cond evt="onNext" delay="0">
                   <p:tgtEl>
                     <p:sldTgt/>
                   </p:tgtEl>
@@ -2673,7 +2995,7 @@
 </file>
 
 <file path=ppt/slides/slide3.xml><?xml version="1.0" encoding="utf-8"?>
-<p:sld xmlns:a="http://schemas.openxmlformats.org/drawingml/2006/main" xmlns:p="http://schemas.openxmlformats.org/presentationml/2006/main" xmlns:r="http://schemas.openxmlformats.org/officeDocument/2006/relationships">
+<p:sld xmlns:a="http://schemas.openxmlformats.org/drawingml/2006/main" xmlns:r="http://schemas.openxmlformats.org/officeDocument/2006/relationships" xmlns:p="http://schemas.openxmlformats.org/presentationml/2006/main">
   <p:cSld>
     <p:spTree>
       <p:nvGrpSpPr>
@@ -2709,13 +3031,20 @@
           </a:ln>
         </p:spPr>
         <p:style>
-          <a:lnRef idx="0"/>
-          <a:fillRef idx="0"/>
-          <a:effectRef idx="0"/>
+          <a:lnRef idx="0">
+            <a:scrgbClr r="0" g="0" b="0"/>
+          </a:lnRef>
+          <a:fillRef idx="0">
+            <a:scrgbClr r="0" g="0" b="0"/>
+          </a:fillRef>
+          <a:effectRef idx="0">
+            <a:scrgbClr r="0" g="0" b="0"/>
+          </a:effectRef>
           <a:fontRef idx="minor"/>
         </p:style>
         <p:txBody>
-          <a:bodyPr lIns="0" rIns="0" tIns="0" bIns="0" anchor="ctr"/>
+          <a:bodyPr lIns="0" tIns="0" rIns="0" bIns="0" anchor="ctr"/>
+          <a:lstStyle/>
           <a:p>
             <a:pPr algn="ctr">
               <a:lnSpc>
@@ -2723,26 +3052,26 @@
               </a:lnSpc>
             </a:pPr>
             <a:r>
-              <a:rPr lang="en-CA" sz="4400" spc="-1" strike="noStrike">
-                <a:solidFill>
-                  <a:srgbClr val="ffffff"/>
+              <a:rPr lang="en-CA" sz="4400" strike="noStrike" spc="-1">
+                <a:solidFill>
+                  <a:srgbClr val="FFFFFF"/>
                 </a:solidFill>
                 <a:uFill>
                   <a:solidFill>
-                    <a:srgbClr val="ffffff"/>
+                    <a:srgbClr val="FFFFFF"/>
                   </a:solidFill>
                 </a:uFill>
                 <a:latin typeface="Arial"/>
               </a:rPr>
               <a:t>Workflow</a:t>
             </a:r>
-            <a:endParaRPr lang="en-CA" sz="1800" spc="-1" strike="noStrike">
-              <a:solidFill>
-                <a:srgbClr val="000000"/>
-              </a:solidFill>
-              <a:uFill>
-                <a:solidFill>
-                  <a:srgbClr val="ffffff"/>
+            <a:endParaRPr lang="en-CA" sz="1800" strike="noStrike" spc="-1">
+              <a:solidFill>
+                <a:srgbClr val="000000"/>
+              </a:solidFill>
+              <a:uFill>
+                <a:solidFill>
+                  <a:srgbClr val="FFFFFF"/>
                 </a:solidFill>
               </a:uFill>
               <a:latin typeface="Arial"/>
@@ -2770,13 +3099,20 @@
           </a:ln>
         </p:spPr>
         <p:style>
-          <a:lnRef idx="0"/>
-          <a:fillRef idx="0"/>
-          <a:effectRef idx="0"/>
+          <a:lnRef idx="0">
+            <a:scrgbClr r="0" g="0" b="0"/>
+          </a:lnRef>
+          <a:fillRef idx="0">
+            <a:scrgbClr r="0" g="0" b="0"/>
+          </a:fillRef>
+          <a:effectRef idx="0">
+            <a:scrgbClr r="0" g="0" b="0"/>
+          </a:effectRef>
           <a:fontRef idx="minor"/>
         </p:style>
         <p:txBody>
-          <a:bodyPr lIns="0" rIns="0" tIns="0" bIns="0"/>
+          <a:bodyPr lIns="0" tIns="0" rIns="0" bIns="0"/>
+          <a:lstStyle/>
           <a:p>
             <a:pPr marL="432000" indent="-323640">
               <a:lnSpc>
@@ -2790,13 +3126,13 @@
               <a:buChar char=""/>
             </a:pPr>
             <a:r>
-              <a:rPr lang="en-CA" sz="3200" spc="-1" strike="noStrike">
+              <a:rPr lang="en-CA" sz="3200" strike="noStrike" spc="-1" dirty="0">
                 <a:solidFill>
                   <a:srgbClr val="000000"/>
                 </a:solidFill>
                 <a:uFill>
                   <a:solidFill>
-                    <a:srgbClr val="ffffff"/>
+                    <a:srgbClr val="FFFFFF"/>
                   </a:solidFill>
                 </a:uFill>
                 <a:latin typeface="Arial"/>
@@ -2804,40 +3140,54 @@
               <a:t>We applied the </a:t>
             </a:r>
             <a:r>
-              <a:rPr b="1" lang="en-CA" sz="3200" spc="-1" strike="noStrike">
+              <a:rPr lang="en-CA" sz="3200" b="1" strike="noStrike" spc="-1" dirty="0" err="1">
                 <a:solidFill>
                   <a:srgbClr val="000000"/>
                 </a:solidFill>
                 <a:uFill>
                   <a:solidFill>
-                    <a:srgbClr val="ffffff"/>
+                    <a:srgbClr val="FFFFFF"/>
                   </a:solidFill>
                 </a:uFill>
                 <a:latin typeface="Arial"/>
               </a:rPr>
-              <a:t>Conncurrent Workflow Model</a:t>
+              <a:t>Conncurrent</a:t>
             </a:r>
             <a:r>
-              <a:rPr lang="en-CA" sz="3200" spc="-1" strike="noStrike">
+              <a:rPr lang="en-CA" sz="3200" b="1" strike="noStrike" spc="-1" dirty="0">
                 <a:solidFill>
                   <a:srgbClr val="000000"/>
                 </a:solidFill>
                 <a:uFill>
                   <a:solidFill>
-                    <a:srgbClr val="ffffff"/>
+                    <a:srgbClr val="FFFFFF"/>
+                  </a:solidFill>
+                </a:uFill>
+                <a:latin typeface="Arial"/>
+              </a:rPr>
+              <a:t> Workflow Model</a:t>
+            </a:r>
+            <a:r>
+              <a:rPr lang="en-CA" sz="3200" strike="noStrike" spc="-1" dirty="0">
+                <a:solidFill>
+                  <a:srgbClr val="000000"/>
+                </a:solidFill>
+                <a:uFill>
+                  <a:solidFill>
+                    <a:srgbClr val="FFFFFF"/>
                   </a:solidFill>
                 </a:uFill>
                 <a:latin typeface="Arial"/>
               </a:rPr>
               <a:t> to build the application</a:t>
             </a:r>
-            <a:endParaRPr lang="en-CA" sz="1800" spc="-1" strike="noStrike">
-              <a:solidFill>
-                <a:srgbClr val="000000"/>
-              </a:solidFill>
-              <a:uFill>
-                <a:solidFill>
-                  <a:srgbClr val="ffffff"/>
+            <a:endParaRPr lang="en-CA" sz="1800" strike="noStrike" spc="-1" dirty="0">
+              <a:solidFill>
+                <a:srgbClr val="000000"/>
+              </a:solidFill>
+              <a:uFill>
+                <a:solidFill>
+                  <a:srgbClr val="FFFFFF"/>
                 </a:solidFill>
               </a:uFill>
               <a:latin typeface="Arial"/>
@@ -2856,26 +3206,26 @@
               <a:buChar char=""/>
             </a:pPr>
             <a:r>
-              <a:rPr lang="en-CA" sz="3200" spc="-1" strike="noStrike">
+              <a:rPr lang="en-CA" sz="3200" strike="noStrike" spc="-1" dirty="0">
                 <a:solidFill>
                   <a:srgbClr val="000000"/>
                 </a:solidFill>
                 <a:uFill>
                   <a:solidFill>
-                    <a:srgbClr val="ffffff"/>
+                    <a:srgbClr val="FFFFFF"/>
                   </a:solidFill>
                 </a:uFill>
                 <a:latin typeface="Arial"/>
               </a:rPr>
               <a:t>This allowed each person to be responsible for specific components of the project  </a:t>
             </a:r>
-            <a:endParaRPr lang="en-CA" sz="1800" spc="-1" strike="noStrike">
-              <a:solidFill>
-                <a:srgbClr val="000000"/>
-              </a:solidFill>
-              <a:uFill>
-                <a:solidFill>
-                  <a:srgbClr val="ffffff"/>
+            <a:endParaRPr lang="en-CA" sz="1800" strike="noStrike" spc="-1" dirty="0">
+              <a:solidFill>
+                <a:srgbClr val="000000"/>
+              </a:solidFill>
+              <a:uFill>
+                <a:solidFill>
+                  <a:srgbClr val="FFFFFF"/>
                 </a:solidFill>
               </a:uFill>
               <a:latin typeface="Arial"/>
@@ -2894,13 +3244,13 @@
               <a:buChar char=""/>
             </a:pPr>
             <a:r>
-              <a:rPr lang="en-CA" sz="3200" spc="-1" strike="noStrike">
+              <a:rPr lang="en-CA" sz="3200" strike="noStrike" spc="-1" dirty="0">
                 <a:solidFill>
                   <a:srgbClr val="000000"/>
                 </a:solidFill>
                 <a:uFill>
                   <a:solidFill>
-                    <a:srgbClr val="ffffff"/>
+                    <a:srgbClr val="FFFFFF"/>
                   </a:solidFill>
                 </a:uFill>
                 <a:latin typeface="Arial"/>
@@ -2908,13 +3258,13 @@
               <a:t>We used </a:t>
             </a:r>
             <a:r>
-              <a:rPr b="1" lang="en-CA" sz="3200" spc="-1" strike="noStrike">
+              <a:rPr lang="en-CA" sz="3200" b="1" strike="noStrike" spc="-1" dirty="0">
                 <a:solidFill>
                   <a:srgbClr val="000000"/>
                 </a:solidFill>
                 <a:uFill>
                   <a:solidFill>
-                    <a:srgbClr val="ffffff"/>
+                    <a:srgbClr val="FFFFFF"/>
                   </a:solidFill>
                 </a:uFill>
                 <a:latin typeface="Arial"/>
@@ -2922,26 +3272,54 @@
               <a:t>GitHub</a:t>
             </a:r>
             <a:r>
-              <a:rPr lang="en-CA" sz="3200" spc="-1" strike="noStrike">
+              <a:rPr lang="en-CA" sz="3200" strike="noStrike" spc="-1" dirty="0">
                 <a:solidFill>
                   <a:srgbClr val="000000"/>
                 </a:solidFill>
                 <a:uFill>
                   <a:solidFill>
-                    <a:srgbClr val="ffffff"/>
+                    <a:srgbClr val="FFFFFF"/>
                   </a:solidFill>
                 </a:uFill>
                 <a:latin typeface="Arial"/>
               </a:rPr>
-              <a:t> as or VCS and collaboration platform</a:t>
+              <a:t> as </a:t>
             </a:r>
-            <a:endParaRPr lang="en-CA" sz="1800" spc="-1" strike="noStrike">
-              <a:solidFill>
-                <a:srgbClr val="000000"/>
-              </a:solidFill>
-              <a:uFill>
-                <a:solidFill>
-                  <a:srgbClr val="ffffff"/>
+            <a:r>
+              <a:rPr lang="en-CA" sz="3200" strike="noStrike" spc="-1" dirty="0" smtClean="0">
+                <a:solidFill>
+                  <a:srgbClr val="000000"/>
+                </a:solidFill>
+                <a:uFill>
+                  <a:solidFill>
+                    <a:srgbClr val="FFFFFF"/>
+                  </a:solidFill>
+                </a:uFill>
+                <a:latin typeface="Arial"/>
+              </a:rPr>
+              <a:t>our </a:t>
+            </a:r>
+            <a:r>
+              <a:rPr lang="en-CA" sz="3200" strike="noStrike" spc="-1" dirty="0">
+                <a:solidFill>
+                  <a:srgbClr val="000000"/>
+                </a:solidFill>
+                <a:uFill>
+                  <a:solidFill>
+                    <a:srgbClr val="FFFFFF"/>
+                  </a:solidFill>
+                </a:uFill>
+                <a:latin typeface="Arial"/>
+              </a:rPr>
+              <a:t>VCS and collaboration platform</a:t>
+            </a:r>
+            <a:endParaRPr lang="en-CA" sz="1800" strike="noStrike" spc="-1" dirty="0">
+              <a:solidFill>
+                <a:srgbClr val="000000"/>
+              </a:solidFill>
+              <a:uFill>
+                <a:solidFill>
+                  <a:srgbClr val="FFFFFF"/>
                 </a:solidFill>
               </a:uFill>
               <a:latin typeface="Arial"/>
@@ -2951,25 +3329,28 @@
       </p:sp>
     </p:spTree>
   </p:cSld>
+  <p:clrMapOvr>
+    <a:masterClrMapping/>
+  </p:clrMapOvr>
   <p:transition>
     <p:push dir="r"/>
   </p:transition>
   <p:timing>
     <p:tnLst>
       <p:par>
-        <p:cTn id="5" dur="indefinite" restart="never" nodeType="tmRoot">
+        <p:cTn id="1" dur="indefinite" restart="never" nodeType="tmRoot">
           <p:childTnLst>
             <p:seq>
-              <p:cTn id="6" nodeType="mainSeq"/>
+              <p:cTn id="2" nodeType="mainSeq"/>
               <p:prevCondLst>
-                <p:cond delay="0" evt="onPrev">
+                <p:cond evt="onPrev" delay="0">
                   <p:tgtEl>
                     <p:sldTgt/>
                   </p:tgtEl>
                 </p:cond>
               </p:prevCondLst>
               <p:nextCondLst>
-                <p:cond delay="0" evt="onNext">
+                <p:cond evt="onNext" delay="0">
                   <p:tgtEl>
                     <p:sldTgt/>
                   </p:tgtEl>
@@ -2985,7 +3366,7 @@
 </file>
 
 <file path=ppt/slides/slide4.xml><?xml version="1.0" encoding="utf-8"?>
-<p:sld xmlns:a="http://schemas.openxmlformats.org/drawingml/2006/main" xmlns:p="http://schemas.openxmlformats.org/presentationml/2006/main" xmlns:r="http://schemas.openxmlformats.org/officeDocument/2006/relationships">
+<p:sld xmlns:a="http://schemas.openxmlformats.org/drawingml/2006/main" xmlns:r="http://schemas.openxmlformats.org/officeDocument/2006/relationships" xmlns:p="http://schemas.openxmlformats.org/presentationml/2006/main">
   <p:cSld>
     <p:spTree>
       <p:nvGrpSpPr>
@@ -3021,13 +3402,20 @@
           </a:ln>
         </p:spPr>
         <p:style>
-          <a:lnRef idx="0"/>
-          <a:fillRef idx="0"/>
-          <a:effectRef idx="0"/>
+          <a:lnRef idx="0">
+            <a:scrgbClr r="0" g="0" b="0"/>
+          </a:lnRef>
+          <a:fillRef idx="0">
+            <a:scrgbClr r="0" g="0" b="0"/>
+          </a:fillRef>
+          <a:effectRef idx="0">
+            <a:scrgbClr r="0" g="0" b="0"/>
+          </a:effectRef>
           <a:fontRef idx="minor"/>
         </p:style>
         <p:txBody>
-          <a:bodyPr lIns="0" rIns="0" tIns="0" bIns="0" anchor="ctr"/>
+          <a:bodyPr lIns="0" tIns="0" rIns="0" bIns="0" anchor="ctr"/>
+          <a:lstStyle/>
           <a:p>
             <a:pPr algn="ctr">
               <a:lnSpc>
@@ -3035,26 +3423,26 @@
               </a:lnSpc>
             </a:pPr>
             <a:r>
-              <a:rPr lang="en-CA" sz="4400" spc="-1" strike="noStrike">
-                <a:solidFill>
-                  <a:srgbClr val="ffffff"/>
+              <a:rPr lang="en-CA" sz="4400" strike="noStrike" spc="-1">
+                <a:solidFill>
+                  <a:srgbClr val="FFFFFF"/>
                 </a:solidFill>
                 <a:uFill>
                   <a:solidFill>
-                    <a:srgbClr val="ffffff"/>
+                    <a:srgbClr val="FFFFFF"/>
                   </a:solidFill>
                 </a:uFill>
                 <a:latin typeface="Arial"/>
               </a:rPr>
               <a:t>Demo</a:t>
             </a:r>
-            <a:endParaRPr lang="en-CA" sz="1800" spc="-1" strike="noStrike">
-              <a:solidFill>
-                <a:srgbClr val="000000"/>
-              </a:solidFill>
-              <a:uFill>
-                <a:solidFill>
-                  <a:srgbClr val="ffffff"/>
+            <a:endParaRPr lang="en-CA" sz="1800" strike="noStrike" spc="-1">
+              <a:solidFill>
+                <a:srgbClr val="000000"/>
+              </a:solidFill>
+              <a:uFill>
+                <a:solidFill>
+                  <a:srgbClr val="FFFFFF"/>
                 </a:solidFill>
               </a:uFill>
               <a:latin typeface="Arial"/>
@@ -3082,13 +3470,20 @@
           </a:ln>
         </p:spPr>
         <p:style>
-          <a:lnRef idx="0"/>
-          <a:fillRef idx="0"/>
-          <a:effectRef idx="0"/>
+          <a:lnRef idx="0">
+            <a:scrgbClr r="0" g="0" b="0"/>
+          </a:lnRef>
+          <a:fillRef idx="0">
+            <a:scrgbClr r="0" g="0" b="0"/>
+          </a:fillRef>
+          <a:effectRef idx="0">
+            <a:scrgbClr r="0" g="0" b="0"/>
+          </a:effectRef>
           <a:fontRef idx="minor"/>
         </p:style>
         <p:txBody>
-          <a:bodyPr lIns="0" rIns="0" tIns="0" bIns="0"/>
+          <a:bodyPr lIns="0" tIns="0" rIns="0" bIns="0"/>
+          <a:lstStyle/>
           <a:p>
             <a:pPr marL="432000" indent="-323640">
               <a:lnSpc>
@@ -3102,26 +3497,26 @@
               <a:buChar char=""/>
             </a:pPr>
             <a:r>
-              <a:rPr lang="en-CA" sz="3200" spc="-1" strike="noStrike">
+              <a:rPr lang="en-CA" sz="3200" strike="noStrike" spc="-1">
                 <a:solidFill>
                   <a:srgbClr val="000000"/>
                 </a:solidFill>
                 <a:uFill>
                   <a:solidFill>
-                    <a:srgbClr val="ffffff"/>
+                    <a:srgbClr val="FFFFFF"/>
                   </a:solidFill>
                 </a:uFill>
                 <a:latin typeface="Arial"/>
               </a:rPr>
               <a:t>A quick Demo of the final application build</a:t>
             </a:r>
-            <a:endParaRPr lang="en-CA" sz="1800" spc="-1" strike="noStrike">
-              <a:solidFill>
-                <a:srgbClr val="000000"/>
-              </a:solidFill>
-              <a:uFill>
-                <a:solidFill>
-                  <a:srgbClr val="ffffff"/>
+            <a:endParaRPr lang="en-CA" sz="1800" strike="noStrike" spc="-1">
+              <a:solidFill>
+                <a:srgbClr val="000000"/>
+              </a:solidFill>
+              <a:uFill>
+                <a:solidFill>
+                  <a:srgbClr val="FFFFFF"/>
                 </a:solidFill>
               </a:uFill>
               <a:latin typeface="Arial"/>
@@ -3131,25 +3526,28 @@
       </p:sp>
     </p:spTree>
   </p:cSld>
+  <p:clrMapOvr>
+    <a:masterClrMapping/>
+  </p:clrMapOvr>
   <p:transition>
     <p:push dir="r"/>
   </p:transition>
   <p:timing>
     <p:tnLst>
       <p:par>
-        <p:cTn id="7" dur="indefinite" restart="never" nodeType="tmRoot">
+        <p:cTn id="1" dur="indefinite" restart="never" nodeType="tmRoot">
           <p:childTnLst>
             <p:seq>
-              <p:cTn id="8" nodeType="mainSeq"/>
+              <p:cTn id="2" nodeType="mainSeq"/>
               <p:prevCondLst>
-                <p:cond delay="0" evt="onPrev">
+                <p:cond evt="onPrev" delay="0">
                   <p:tgtEl>
                     <p:sldTgt/>
                   </p:tgtEl>
                 </p:cond>
               </p:prevCondLst>
               <p:nextCondLst>
-                <p:cond delay="0" evt="onNext">
+                <p:cond evt="onNext" delay="0">
                   <p:tgtEl>
                     <p:sldTgt/>
                   </p:tgtEl>
@@ -3165,7 +3563,7 @@
 </file>
 
 <file path=ppt/slides/slide5.xml><?xml version="1.0" encoding="utf-8"?>
-<p:sld xmlns:a="http://schemas.openxmlformats.org/drawingml/2006/main" xmlns:p="http://schemas.openxmlformats.org/presentationml/2006/main" xmlns:r="http://schemas.openxmlformats.org/officeDocument/2006/relationships">
+<p:sld xmlns:a="http://schemas.openxmlformats.org/drawingml/2006/main" xmlns:r="http://schemas.openxmlformats.org/officeDocument/2006/relationships" xmlns:p="http://schemas.openxmlformats.org/presentationml/2006/main">
   <p:cSld>
     <p:spTree>
       <p:nvGrpSpPr>
@@ -3201,13 +3599,20 @@
           </a:ln>
         </p:spPr>
         <p:style>
-          <a:lnRef idx="0"/>
-          <a:fillRef idx="0"/>
-          <a:effectRef idx="0"/>
+          <a:lnRef idx="0">
+            <a:scrgbClr r="0" g="0" b="0"/>
+          </a:lnRef>
+          <a:fillRef idx="0">
+            <a:scrgbClr r="0" g="0" b="0"/>
+          </a:fillRef>
+          <a:effectRef idx="0">
+            <a:scrgbClr r="0" g="0" b="0"/>
+          </a:effectRef>
           <a:fontRef idx="minor"/>
         </p:style>
         <p:txBody>
-          <a:bodyPr lIns="0" rIns="0" tIns="0" bIns="0" anchor="ctr"/>
+          <a:bodyPr lIns="0" tIns="0" rIns="0" bIns="0" anchor="ctr"/>
+          <a:lstStyle/>
           <a:p>
             <a:pPr algn="ctr">
               <a:lnSpc>
@@ -3215,26 +3620,26 @@
               </a:lnSpc>
             </a:pPr>
             <a:r>
-              <a:rPr lang="en-CA" sz="4400" spc="-1" strike="noStrike">
-                <a:solidFill>
-                  <a:srgbClr val="ffffff"/>
+              <a:rPr lang="en-CA" sz="4400" strike="noStrike" spc="-1">
+                <a:solidFill>
+                  <a:srgbClr val="FFFFFF"/>
                 </a:solidFill>
                 <a:uFill>
                   <a:solidFill>
-                    <a:srgbClr val="ffffff"/>
+                    <a:srgbClr val="FFFFFF"/>
                   </a:solidFill>
                 </a:uFill>
                 <a:latin typeface="Arial"/>
               </a:rPr>
               <a:t>UI Design</a:t>
             </a:r>
-            <a:endParaRPr lang="en-CA" sz="1800" spc="-1" strike="noStrike">
-              <a:solidFill>
-                <a:srgbClr val="000000"/>
-              </a:solidFill>
-              <a:uFill>
-                <a:solidFill>
-                  <a:srgbClr val="ffffff"/>
+            <a:endParaRPr lang="en-CA" sz="1800" strike="noStrike" spc="-1">
+              <a:solidFill>
+                <a:srgbClr val="000000"/>
+              </a:solidFill>
+              <a:uFill>
+                <a:solidFill>
+                  <a:srgbClr val="FFFFFF"/>
                 </a:solidFill>
               </a:uFill>
               <a:latin typeface="Arial"/>
@@ -3262,13 +3667,20 @@
           </a:ln>
         </p:spPr>
         <p:style>
-          <a:lnRef idx="0"/>
-          <a:fillRef idx="0"/>
-          <a:effectRef idx="0"/>
+          <a:lnRef idx="0">
+            <a:scrgbClr r="0" g="0" b="0"/>
+          </a:lnRef>
+          <a:fillRef idx="0">
+            <a:scrgbClr r="0" g="0" b="0"/>
+          </a:fillRef>
+          <a:effectRef idx="0">
+            <a:scrgbClr r="0" g="0" b="0"/>
+          </a:effectRef>
           <a:fontRef idx="minor"/>
         </p:style>
         <p:txBody>
-          <a:bodyPr lIns="0" rIns="0" tIns="0" bIns="0"/>
+          <a:bodyPr lIns="0" tIns="0" rIns="0" bIns="0"/>
+          <a:lstStyle/>
           <a:p>
             <a:pPr marL="432000" indent="-323640">
               <a:lnSpc>
@@ -3282,26 +3694,26 @@
               <a:buChar char=""/>
             </a:pPr>
             <a:r>
-              <a:rPr lang="en-CA" sz="3200" spc="-1" strike="noStrike">
+              <a:rPr lang="en-CA" sz="3200" strike="noStrike" spc="-1">
                 <a:solidFill>
                   <a:srgbClr val="000000"/>
                 </a:solidFill>
                 <a:uFill>
                   <a:solidFill>
-                    <a:srgbClr val="ffffff"/>
+                    <a:srgbClr val="FFFFFF"/>
                   </a:solidFill>
                 </a:uFill>
                 <a:latin typeface="Arial"/>
               </a:rPr>
               <a:t>&lt;Add image/screenshot of UI&gt;</a:t>
             </a:r>
-            <a:endParaRPr lang="en-CA" sz="1800" spc="-1" strike="noStrike">
-              <a:solidFill>
-                <a:srgbClr val="000000"/>
-              </a:solidFill>
-              <a:uFill>
-                <a:solidFill>
-                  <a:srgbClr val="ffffff"/>
+            <a:endParaRPr lang="en-CA" sz="1800" strike="noStrike" spc="-1">
+              <a:solidFill>
+                <a:srgbClr val="000000"/>
+              </a:solidFill>
+              <a:uFill>
+                <a:solidFill>
+                  <a:srgbClr val="FFFFFF"/>
                 </a:solidFill>
               </a:uFill>
               <a:latin typeface="Arial"/>
@@ -3320,26 +3732,26 @@
               <a:buChar char=""/>
             </a:pPr>
             <a:r>
-              <a:rPr lang="en-CA" sz="3200" spc="-1" strike="noStrike">
+              <a:rPr lang="en-CA" sz="3200" strike="noStrike" spc="-1">
                 <a:solidFill>
                   <a:srgbClr val="000000"/>
                 </a:solidFill>
                 <a:uFill>
                   <a:solidFill>
-                    <a:srgbClr val="ffffff"/>
+                    <a:srgbClr val="FFFFFF"/>
                   </a:solidFill>
                 </a:uFill>
                 <a:latin typeface="Arial"/>
               </a:rPr>
               <a:t>&lt;Provide description and copy slide if needed&gt;</a:t>
             </a:r>
-            <a:endParaRPr lang="en-CA" sz="1800" spc="-1" strike="noStrike">
-              <a:solidFill>
-                <a:srgbClr val="000000"/>
-              </a:solidFill>
-              <a:uFill>
-                <a:solidFill>
-                  <a:srgbClr val="ffffff"/>
+            <a:endParaRPr lang="en-CA" sz="1800" strike="noStrike" spc="-1">
+              <a:solidFill>
+                <a:srgbClr val="000000"/>
+              </a:solidFill>
+              <a:uFill>
+                <a:solidFill>
+                  <a:srgbClr val="FFFFFF"/>
                 </a:solidFill>
               </a:uFill>
               <a:latin typeface="Arial"/>
@@ -3349,25 +3761,28 @@
       </p:sp>
     </p:spTree>
   </p:cSld>
+  <p:clrMapOvr>
+    <a:masterClrMapping/>
+  </p:clrMapOvr>
   <p:transition>
     <p:push dir="r"/>
   </p:transition>
   <p:timing>
     <p:tnLst>
       <p:par>
-        <p:cTn id="9" dur="indefinite" restart="never" nodeType="tmRoot">
+        <p:cTn id="1" dur="indefinite" restart="never" nodeType="tmRoot">
           <p:childTnLst>
             <p:seq>
-              <p:cTn id="10" nodeType="mainSeq"/>
+              <p:cTn id="2" nodeType="mainSeq"/>
               <p:prevCondLst>
-                <p:cond delay="0" evt="onPrev">
+                <p:cond evt="onPrev" delay="0">
                   <p:tgtEl>
                     <p:sldTgt/>
                   </p:tgtEl>
                 </p:cond>
               </p:prevCondLst>
               <p:nextCondLst>
-                <p:cond delay="0" evt="onNext">
+                <p:cond evt="onNext" delay="0">
                   <p:tgtEl>
                     <p:sldTgt/>
                   </p:tgtEl>
@@ -3383,7 +3798,7 @@
 </file>
 
 <file path=ppt/slides/slide6.xml><?xml version="1.0" encoding="utf-8"?>
-<p:sld xmlns:a="http://schemas.openxmlformats.org/drawingml/2006/main" xmlns:p="http://schemas.openxmlformats.org/presentationml/2006/main" xmlns:r="http://schemas.openxmlformats.org/officeDocument/2006/relationships">
+<p:sld xmlns:a="http://schemas.openxmlformats.org/drawingml/2006/main" xmlns:r="http://schemas.openxmlformats.org/officeDocument/2006/relationships" xmlns:p="http://schemas.openxmlformats.org/presentationml/2006/main">
   <p:cSld>
     <p:spTree>
       <p:nvGrpSpPr>
@@ -3419,13 +3834,20 @@
           </a:ln>
         </p:spPr>
         <p:style>
-          <a:lnRef idx="0"/>
-          <a:fillRef idx="0"/>
-          <a:effectRef idx="0"/>
+          <a:lnRef idx="0">
+            <a:scrgbClr r="0" g="0" b="0"/>
+          </a:lnRef>
+          <a:fillRef idx="0">
+            <a:scrgbClr r="0" g="0" b="0"/>
+          </a:fillRef>
+          <a:effectRef idx="0">
+            <a:scrgbClr r="0" g="0" b="0"/>
+          </a:effectRef>
           <a:fontRef idx="minor"/>
         </p:style>
         <p:txBody>
-          <a:bodyPr lIns="0" rIns="0" tIns="0" bIns="0" anchor="ctr"/>
+          <a:bodyPr lIns="0" tIns="0" rIns="0" bIns="0" anchor="ctr"/>
+          <a:lstStyle/>
           <a:p>
             <a:pPr algn="ctr">
               <a:lnSpc>
@@ -3433,26 +3855,26 @@
               </a:lnSpc>
             </a:pPr>
             <a:r>
-              <a:rPr lang="en-CA" sz="4400" spc="-1" strike="noStrike">
-                <a:solidFill>
-                  <a:srgbClr val="ffffff"/>
+              <a:rPr lang="en-CA" sz="4400" strike="noStrike" spc="-1">
+                <a:solidFill>
+                  <a:srgbClr val="FFFFFF"/>
                 </a:solidFill>
                 <a:uFill>
                   <a:solidFill>
-                    <a:srgbClr val="ffffff"/>
+                    <a:srgbClr val="FFFFFF"/>
                   </a:solidFill>
                 </a:uFill>
                 <a:latin typeface="Arial"/>
               </a:rPr>
               <a:t>Program Logic</a:t>
             </a:r>
-            <a:endParaRPr lang="en-CA" sz="1800" spc="-1" strike="noStrike">
-              <a:solidFill>
-                <a:srgbClr val="000000"/>
-              </a:solidFill>
-              <a:uFill>
-                <a:solidFill>
-                  <a:srgbClr val="ffffff"/>
+            <a:endParaRPr lang="en-CA" sz="1800" strike="noStrike" spc="-1">
+              <a:solidFill>
+                <a:srgbClr val="000000"/>
+              </a:solidFill>
+              <a:uFill>
+                <a:solidFill>
+                  <a:srgbClr val="FFFFFF"/>
                 </a:solidFill>
               </a:uFill>
               <a:latin typeface="Arial"/>
@@ -3480,13 +3902,20 @@
           </a:ln>
         </p:spPr>
         <p:style>
-          <a:lnRef idx="0"/>
-          <a:fillRef idx="0"/>
-          <a:effectRef idx="0"/>
+          <a:lnRef idx="0">
+            <a:scrgbClr r="0" g="0" b="0"/>
+          </a:lnRef>
+          <a:fillRef idx="0">
+            <a:scrgbClr r="0" g="0" b="0"/>
+          </a:fillRef>
+          <a:effectRef idx="0">
+            <a:scrgbClr r="0" g="0" b="0"/>
+          </a:effectRef>
           <a:fontRef idx="minor"/>
         </p:style>
         <p:txBody>
-          <a:bodyPr lIns="0" rIns="0" tIns="0" bIns="0"/>
+          <a:bodyPr lIns="0" tIns="0" rIns="0" bIns="0"/>
+          <a:lstStyle/>
           <a:p>
             <a:pPr marL="432000" indent="-323640">
               <a:lnSpc>
@@ -3500,26 +3929,26 @@
               <a:buChar char=""/>
             </a:pPr>
             <a:r>
-              <a:rPr lang="en-CA" sz="3200" spc="-1" strike="noStrike">
+              <a:rPr lang="en-CA" sz="3200" strike="noStrike" spc="-1">
                 <a:solidFill>
                   <a:srgbClr val="000000"/>
                 </a:solidFill>
                 <a:uFill>
                   <a:solidFill>
-                    <a:srgbClr val="ffffff"/>
+                    <a:srgbClr val="FFFFFF"/>
                   </a:solidFill>
                 </a:uFill>
                 <a:latin typeface="Arial"/>
               </a:rPr>
               <a:t>&lt;Try to include image UML diragram&gt;</a:t>
             </a:r>
-            <a:endParaRPr lang="en-CA" sz="1800" spc="-1" strike="noStrike">
-              <a:solidFill>
-                <a:srgbClr val="000000"/>
-              </a:solidFill>
-              <a:uFill>
-                <a:solidFill>
-                  <a:srgbClr val="ffffff"/>
+            <a:endParaRPr lang="en-CA" sz="1800" strike="noStrike" spc="-1">
+              <a:solidFill>
+                <a:srgbClr val="000000"/>
+              </a:solidFill>
+              <a:uFill>
+                <a:solidFill>
+                  <a:srgbClr val="FFFFFF"/>
                 </a:solidFill>
               </a:uFill>
               <a:latin typeface="Arial"/>
@@ -3538,26 +3967,26 @@
               <a:buChar char=""/>
             </a:pPr>
             <a:r>
-              <a:rPr lang="en-CA" sz="3200" spc="-1" strike="noStrike">
+              <a:rPr lang="en-CA" sz="3200" strike="noStrike" spc="-1">
                 <a:solidFill>
                   <a:srgbClr val="000000"/>
                 </a:solidFill>
                 <a:uFill>
                   <a:solidFill>
-                    <a:srgbClr val="ffffff"/>
+                    <a:srgbClr val="FFFFFF"/>
                   </a:solidFill>
                 </a:uFill>
                 <a:latin typeface="Arial"/>
               </a:rPr>
               <a:t>&lt;provide description&gt;</a:t>
             </a:r>
-            <a:endParaRPr lang="en-CA" sz="1800" spc="-1" strike="noStrike">
-              <a:solidFill>
-                <a:srgbClr val="000000"/>
-              </a:solidFill>
-              <a:uFill>
-                <a:solidFill>
-                  <a:srgbClr val="ffffff"/>
+            <a:endParaRPr lang="en-CA" sz="1800" strike="noStrike" spc="-1">
+              <a:solidFill>
+                <a:srgbClr val="000000"/>
+              </a:solidFill>
+              <a:uFill>
+                <a:solidFill>
+                  <a:srgbClr val="FFFFFF"/>
                 </a:solidFill>
               </a:uFill>
               <a:latin typeface="Arial"/>
@@ -3567,25 +3996,28 @@
       </p:sp>
     </p:spTree>
   </p:cSld>
+  <p:clrMapOvr>
+    <a:masterClrMapping/>
+  </p:clrMapOvr>
   <p:transition>
     <p:push dir="r"/>
   </p:transition>
   <p:timing>
     <p:tnLst>
       <p:par>
-        <p:cTn id="11" dur="indefinite" restart="never" nodeType="tmRoot">
+        <p:cTn id="1" dur="indefinite" restart="never" nodeType="tmRoot">
           <p:childTnLst>
             <p:seq>
-              <p:cTn id="12" nodeType="mainSeq"/>
+              <p:cTn id="2" nodeType="mainSeq"/>
               <p:prevCondLst>
-                <p:cond delay="0" evt="onPrev">
+                <p:cond evt="onPrev" delay="0">
                   <p:tgtEl>
                     <p:sldTgt/>
                   </p:tgtEl>
                 </p:cond>
               </p:prevCondLst>
               <p:nextCondLst>
-                <p:cond delay="0" evt="onNext">
+                <p:cond evt="onNext" delay="0">
                   <p:tgtEl>
                     <p:sldTgt/>
                   </p:tgtEl>
@@ -3820,5 +4252,7 @@
       </a:bgFillStyleLst>
     </a:fmtScheme>
   </a:themeElements>
+  <a:objectDefaults/>
+  <a:extraClrSchemeLst/>
 </a:theme>
 </file>
</xml_diff>